<commit_message>
Adding infinite horizon game
</commit_message>
<xml_diff>
--- a/MF coordination/SI_game/Monetary and Fiscal Policy Coordination.pptx
+++ b/MF coordination/SI_game/Monetary and Fiscal Policy Coordination.pptx
@@ -5,10 +5,10 @@
     <p:sldMasterId id="2147483650" r:id="rId1"/>
   </p:sldMasterIdLst>
   <p:notesMasterIdLst>
-    <p:notesMasterId r:id="rId28"/>
+    <p:notesMasterId r:id="rId30"/>
   </p:notesMasterIdLst>
   <p:handoutMasterIdLst>
-    <p:handoutMasterId r:id="rId29"/>
+    <p:handoutMasterId r:id="rId31"/>
   </p:handoutMasterIdLst>
   <p:sldIdLst>
     <p:sldId id="256" r:id="rId2"/>
@@ -35,8 +35,10 @@
     <p:sldId id="278" r:id="rId23"/>
     <p:sldId id="260" r:id="rId24"/>
     <p:sldId id="292" r:id="rId25"/>
-    <p:sldId id="261" r:id="rId26"/>
-    <p:sldId id="262" r:id="rId27"/>
+    <p:sldId id="295" r:id="rId26"/>
+    <p:sldId id="296" r:id="rId27"/>
+    <p:sldId id="261" r:id="rId28"/>
+    <p:sldId id="262" r:id="rId29"/>
   </p:sldIdLst>
   <p:sldSz cx="9144000" cy="5143500" type="screen16x9"/>
   <p:notesSz cx="6797675" cy="9928225"/>
@@ -2231,7 +2233,7 @@
             <a:fld id="{72E6E50C-42F6-44F9-849C-F9C68685802B}" type="datetimeFigureOut">
               <a:rPr lang="en-AU" smtClean="0"/>
               <a:pPr/>
-              <a:t>7/10/2024</a:t>
+              <a:t>8/10/2024</a:t>
             </a:fld>
             <a:endParaRPr lang="en-AU"/>
           </a:p>
@@ -2407,7 +2409,7 @@
             <a:fld id="{746BCAF0-30A3-4E26-855A-16D175EBDECD}" type="datetime1">
               <a:rPr lang="en-AU"/>
               <a:pPr/>
-              <a:t>7/10/2024</a:t>
+              <a:t>8/10/2024</a:t>
             </a:fld>
             <a:endParaRPr lang="en-AU"/>
           </a:p>
@@ -4099,30 +4101,20 @@
           <a:bodyPr/>
           <a:lstStyle/>
           <a:p>
-            <a:pPr marL="0" marR="0" lvl="0" indent="0" algn="l" defTabSz="914400" rtl="0" eaLnBrk="0" fontAlgn="base" latinLnBrk="0" hangingPunct="0">
-              <a:lnSpc>
-                <a:spcPct val="100000"/>
-              </a:lnSpc>
-              <a:spcBef>
-                <a:spcPct val="30000"/>
-              </a:spcBef>
-              <a:spcAft>
-                <a:spcPct val="0"/>
-              </a:spcAft>
-              <a:buClrTx/>
-              <a:buSzTx/>
-              <a:buFontTx/>
-              <a:buNone/>
-              <a:tabLst/>
-              <a:defRPr/>
-            </a:pPr>
             <a:r>
               <a:rPr lang="en-US" dirty="0"/>
-              <a:t>“prisoners dilemma” , where both monetary and fiscal authorities would have been better off if they had not tried to counteract each others policy. </a:t>
-            </a:r>
-          </a:p>
-          <a:p>
-            <a:endParaRPr lang="en-AU" dirty="0"/>
+              <a:t>Describe in words that we have a model that is the same as above, however there is now an adjustment cost for changing your policy settings between stage 1 and 2.  In both stages “demand” is low by the same amount, so the optimal policy should be symmetric. However, the strategic incentive does influence choices.</a:t>
+            </a:r>
+          </a:p>
+          <a:p>
+            <a:endParaRPr lang="en-US" dirty="0"/>
+          </a:p>
+          <a:p>
+            <a:r>
+              <a:rPr lang="en-US" dirty="0"/>
+              <a:t>Why we coded the static game in R, have switched to Julia to solve this model, and will use Julia for the infinite horizon version.</a:t>
+            </a:r>
+            <a:endParaRPr lang="en-NZ" dirty="0"/>
           </a:p>
         </p:txBody>
       </p:sp>
@@ -4133,7 +4125,7 @@
             <a:spLocks noGrp="1"/>
           </p:cNvSpPr>
           <p:nvPr>
-            <p:ph type="sldNum" sz="quarter" idx="10"/>
+            <p:ph type="sldNum" sz="quarter" idx="5"/>
           </p:nvPr>
         </p:nvSpPr>
         <p:spPr/>
@@ -4153,7 +4145,7 @@
     </p:spTree>
     <p:extLst>
       <p:ext uri="{BB962C8B-B14F-4D97-AF65-F5344CB8AC3E}">
-        <p14:creationId xmlns:p14="http://schemas.microsoft.com/office/powerpoint/2010/main" val="2687625394"/>
+        <p14:creationId xmlns:p14="http://schemas.microsoft.com/office/powerpoint/2010/main" val="368655684"/>
       </p:ext>
     </p:extLst>
   </p:cSld>
@@ -4207,7 +4199,115 @@
           <a:bodyPr/>
           <a:lstStyle/>
           <a:p>
+            <a:endParaRPr lang="en-NZ" dirty="0"/>
+          </a:p>
+        </p:txBody>
+      </p:sp>
+      <p:sp>
+        <p:nvSpPr>
+          <p:cNvPr id="4" name="Slide Number Placeholder 3"/>
+          <p:cNvSpPr>
+            <a:spLocks noGrp="1"/>
+          </p:cNvSpPr>
+          <p:nvPr>
+            <p:ph type="sldNum" sz="quarter" idx="5"/>
+          </p:nvPr>
+        </p:nvSpPr>
+        <p:spPr/>
+        <p:txBody>
+          <a:bodyPr/>
+          <a:lstStyle/>
+          <a:p>
+            <a:fld id="{22FC436C-5653-4517-9B94-0BB68ACE2454}" type="slidenum">
+              <a:rPr lang="en-AU" smtClean="0"/>
+              <a:pPr/>
+              <a:t>26</a:t>
+            </a:fld>
             <a:endParaRPr lang="en-AU"/>
+          </a:p>
+        </p:txBody>
+      </p:sp>
+    </p:spTree>
+    <p:extLst>
+      <p:ext uri="{BB962C8B-B14F-4D97-AF65-F5344CB8AC3E}">
+        <p14:creationId xmlns:p14="http://schemas.microsoft.com/office/powerpoint/2010/main" val="391078657"/>
+      </p:ext>
+    </p:extLst>
+  </p:cSld>
+  <p:clrMapOvr>
+    <a:masterClrMapping/>
+  </p:clrMapOvr>
+</p:notes>
+</file>
+
+<file path=ppt/notesSlides/notesSlide24.xml><?xml version="1.0" encoding="utf-8"?>
+<p:notes xmlns:a="http://schemas.openxmlformats.org/drawingml/2006/main" xmlns:r="http://schemas.openxmlformats.org/officeDocument/2006/relationships" xmlns:p="http://schemas.openxmlformats.org/presentationml/2006/main">
+  <p:cSld>
+    <p:spTree>
+      <p:nvGrpSpPr>
+        <p:cNvPr id="1" name=""/>
+        <p:cNvGrpSpPr/>
+        <p:nvPr/>
+      </p:nvGrpSpPr>
+      <p:grpSpPr>
+        <a:xfrm>
+          <a:off x="0" y="0"/>
+          <a:ext cx="0" cy="0"/>
+          <a:chOff x="0" y="0"/>
+          <a:chExt cx="0" cy="0"/>
+        </a:xfrm>
+      </p:grpSpPr>
+      <p:sp>
+        <p:nvSpPr>
+          <p:cNvPr id="2" name="Slide Image Placeholder 1"/>
+          <p:cNvSpPr>
+            <a:spLocks noGrp="1" noRot="1" noChangeAspect="1"/>
+          </p:cNvSpPr>
+          <p:nvPr>
+            <p:ph type="sldImg"/>
+          </p:nvPr>
+        </p:nvSpPr>
+        <p:spPr/>
+      </p:sp>
+      <p:sp>
+        <p:nvSpPr>
+          <p:cNvPr id="3" name="Notes Placeholder 2"/>
+          <p:cNvSpPr>
+            <a:spLocks noGrp="1"/>
+          </p:cNvSpPr>
+          <p:nvPr>
+            <p:ph type="body" idx="1"/>
+          </p:nvPr>
+        </p:nvSpPr>
+        <p:spPr/>
+        <p:txBody>
+          <a:bodyPr/>
+          <a:lstStyle/>
+          <a:p>
+            <a:pPr marL="0" marR="0" lvl="0" indent="0" algn="l" defTabSz="914400" rtl="0" eaLnBrk="0" fontAlgn="base" latinLnBrk="0" hangingPunct="0">
+              <a:lnSpc>
+                <a:spcPct val="100000"/>
+              </a:lnSpc>
+              <a:spcBef>
+                <a:spcPct val="30000"/>
+              </a:spcBef>
+              <a:spcAft>
+                <a:spcPct val="0"/>
+              </a:spcAft>
+              <a:buClrTx/>
+              <a:buSzTx/>
+              <a:buFontTx/>
+              <a:buNone/>
+              <a:tabLst/>
+              <a:defRPr/>
+            </a:pPr>
+            <a:r>
+              <a:rPr lang="en-US" dirty="0"/>
+              <a:t>“prisoners dilemma” , where both monetary and fiscal authorities would have been better off if they had not tried to counteract each others policy. </a:t>
+            </a:r>
+          </a:p>
+          <a:p>
+            <a:endParaRPr lang="en-AU" dirty="0"/>
           </a:p>
         </p:txBody>
       </p:sp>
@@ -4229,7 +4329,92 @@
             <a:fld id="{22FC436C-5653-4517-9B94-0BB68ACE2454}" type="slidenum">
               <a:rPr lang="en-AU" smtClean="0"/>
               <a:pPr/>
-              <a:t>26</a:t>
+              <a:t>27</a:t>
+            </a:fld>
+            <a:endParaRPr lang="en-AU"/>
+          </a:p>
+        </p:txBody>
+      </p:sp>
+    </p:spTree>
+    <p:extLst>
+      <p:ext uri="{BB962C8B-B14F-4D97-AF65-F5344CB8AC3E}">
+        <p14:creationId xmlns:p14="http://schemas.microsoft.com/office/powerpoint/2010/main" val="2687625394"/>
+      </p:ext>
+    </p:extLst>
+  </p:cSld>
+  <p:clrMapOvr>
+    <a:masterClrMapping/>
+  </p:clrMapOvr>
+</p:notes>
+</file>
+
+<file path=ppt/notesSlides/notesSlide25.xml><?xml version="1.0" encoding="utf-8"?>
+<p:notes xmlns:a="http://schemas.openxmlformats.org/drawingml/2006/main" xmlns:r="http://schemas.openxmlformats.org/officeDocument/2006/relationships" xmlns:p="http://schemas.openxmlformats.org/presentationml/2006/main">
+  <p:cSld>
+    <p:spTree>
+      <p:nvGrpSpPr>
+        <p:cNvPr id="1" name=""/>
+        <p:cNvGrpSpPr/>
+        <p:nvPr/>
+      </p:nvGrpSpPr>
+      <p:grpSpPr>
+        <a:xfrm>
+          <a:off x="0" y="0"/>
+          <a:ext cx="0" cy="0"/>
+          <a:chOff x="0" y="0"/>
+          <a:chExt cx="0" cy="0"/>
+        </a:xfrm>
+      </p:grpSpPr>
+      <p:sp>
+        <p:nvSpPr>
+          <p:cNvPr id="2" name="Slide Image Placeholder 1"/>
+          <p:cNvSpPr>
+            <a:spLocks noGrp="1" noRot="1" noChangeAspect="1"/>
+          </p:cNvSpPr>
+          <p:nvPr>
+            <p:ph type="sldImg"/>
+          </p:nvPr>
+        </p:nvSpPr>
+        <p:spPr/>
+      </p:sp>
+      <p:sp>
+        <p:nvSpPr>
+          <p:cNvPr id="3" name="Notes Placeholder 2"/>
+          <p:cNvSpPr>
+            <a:spLocks noGrp="1"/>
+          </p:cNvSpPr>
+          <p:nvPr>
+            <p:ph type="body" idx="1"/>
+          </p:nvPr>
+        </p:nvSpPr>
+        <p:spPr/>
+        <p:txBody>
+          <a:bodyPr/>
+          <a:lstStyle/>
+          <a:p>
+            <a:endParaRPr lang="en-AU"/>
+          </a:p>
+        </p:txBody>
+      </p:sp>
+      <p:sp>
+        <p:nvSpPr>
+          <p:cNvPr id="4" name="Slide Number Placeholder 3"/>
+          <p:cNvSpPr>
+            <a:spLocks noGrp="1"/>
+          </p:cNvSpPr>
+          <p:nvPr>
+            <p:ph type="sldNum" sz="quarter" idx="10"/>
+          </p:nvPr>
+        </p:nvSpPr>
+        <p:spPr/>
+        <p:txBody>
+          <a:bodyPr/>
+          <a:lstStyle/>
+          <a:p>
+            <a:fld id="{22FC436C-5653-4517-9B94-0BB68ACE2454}" type="slidenum">
+              <a:rPr lang="en-AU" smtClean="0"/>
+              <a:pPr/>
+              <a:t>28</a:t>
             </a:fld>
             <a:endParaRPr lang="en-AU"/>
           </a:p>
@@ -6173,7 +6358,7 @@
           <a:p>
             <a:fld id="{A09C5C50-442C-4270-89D8-174894833343}" type="datetime1">
               <a:rPr lang="en-AU" smtClean="0"/>
-              <a:t>7/10/2024</a:t>
+              <a:t>8/10/2024</a:t>
             </a:fld>
             <a:endParaRPr lang="en-AU" dirty="0"/>
           </a:p>
@@ -8966,7 +9151,7 @@
           <a:p>
             <a:fld id="{A09C5C50-442C-4270-89D8-174894833343}" type="datetime1">
               <a:rPr lang="en-AU" smtClean="0"/>
-              <a:t>7/10/2024</a:t>
+              <a:t>8/10/2024</a:t>
             </a:fld>
             <a:endParaRPr lang="en-AU" dirty="0"/>
           </a:p>
@@ -9229,7 +9414,7 @@
           <a:p>
             <a:fld id="{A09C5C50-442C-4270-89D8-174894833343}" type="datetime1">
               <a:rPr lang="en-AU" smtClean="0"/>
-              <a:t>7/10/2024</a:t>
+              <a:t>8/10/2024</a:t>
             </a:fld>
             <a:endParaRPr lang="en-AU" dirty="0"/>
           </a:p>
@@ -9446,7 +9631,7 @@
           <a:p>
             <a:fld id="{A09C5C50-442C-4270-89D8-174894833343}" type="datetime1">
               <a:rPr lang="en-AU" smtClean="0"/>
-              <a:t>7/10/2024</a:t>
+              <a:t>8/10/2024</a:t>
             </a:fld>
             <a:endParaRPr lang="en-AU" dirty="0"/>
           </a:p>
@@ -9922,7 +10107,7 @@
           <a:p>
             <a:fld id="{A09C5C50-442C-4270-89D8-174894833343}" type="datetime1">
               <a:rPr lang="en-AU" smtClean="0"/>
-              <a:t>7/10/2024</a:t>
+              <a:t>8/10/2024</a:t>
             </a:fld>
             <a:endParaRPr lang="en-AU" dirty="0"/>
           </a:p>
@@ -10283,7 +10468,7 @@
           <a:p>
             <a:fld id="{A09C5C50-442C-4270-89D8-174894833343}" type="datetime1">
               <a:rPr lang="en-AU" smtClean="0"/>
-              <a:t>7/10/2024</a:t>
+              <a:t>8/10/2024</a:t>
             </a:fld>
             <a:endParaRPr lang="en-AU" dirty="0"/>
           </a:p>
@@ -10780,7 +10965,7 @@
           <a:p>
             <a:fld id="{A09C5C50-442C-4270-89D8-174894833343}" type="datetime1">
               <a:rPr lang="en-AU" smtClean="0"/>
-              <a:t>7/10/2024</a:t>
+              <a:t>8/10/2024</a:t>
             </a:fld>
             <a:endParaRPr lang="en-AU" dirty="0"/>
           </a:p>
@@ -11443,7 +11628,7 @@
           <a:p>
             <a:fld id="{A09C5C50-442C-4270-89D8-174894833343}" type="datetime1">
               <a:rPr lang="en-AU" smtClean="0"/>
-              <a:t>7/10/2024</a:t>
+              <a:t>8/10/2024</a:t>
             </a:fld>
             <a:endParaRPr lang="en-AU" dirty="0"/>
           </a:p>
@@ -11613,7 +11798,7 @@
           <a:p>
             <a:fld id="{A09C5C50-442C-4270-89D8-174894833343}" type="datetime1">
               <a:rPr lang="en-AU" smtClean="0"/>
-              <a:t>7/10/2024</a:t>
+              <a:t>8/10/2024</a:t>
             </a:fld>
             <a:endParaRPr lang="en-AU" dirty="0"/>
           </a:p>
@@ -11800,7 +11985,7 @@
           <a:p>
             <a:fld id="{A09C5C50-442C-4270-89D8-174894833343}" type="datetime1">
               <a:rPr lang="en-AU" smtClean="0"/>
-              <a:t>7/10/2024</a:t>
+              <a:t>8/10/2024</a:t>
             </a:fld>
             <a:endParaRPr lang="en-AU" dirty="0"/>
           </a:p>
@@ -12072,7 +12257,7 @@
           <a:p>
             <a:fld id="{A09C5C50-442C-4270-89D8-174894833343}" type="datetime1">
               <a:rPr lang="en-AU" smtClean="0"/>
-              <a:t>7/10/2024</a:t>
+              <a:t>8/10/2024</a:t>
             </a:fld>
             <a:endParaRPr lang="en-AU" dirty="0"/>
           </a:p>
@@ -15492,7 +15677,7 @@
           <a:p>
             <a:r>
               <a:rPr lang="en-AU" dirty="0"/>
-              <a:t>Early two-choice results (demand shock)</a:t>
+              <a:t>Early two-choice results</a:t>
             </a:r>
           </a:p>
         </p:txBody>
@@ -15515,10 +15700,49 @@
         </p:nvSpPr>
         <p:spPr/>
         <p:txBody>
-          <a:bodyPr/>
+          <a:bodyPr>
+            <a:normAutofit fontScale="85000" lnSpcReduction="20000"/>
+          </a:bodyPr>
           <a:lstStyle/>
           <a:p>
-            <a:endParaRPr lang="en-NZ"/>
+            <a:pPr marL="0" indent="0">
+              <a:buNone/>
+            </a:pPr>
+            <a:r>
+              <a:rPr lang="en-NZ" b="1" dirty="0"/>
+              <a:t>Approach</a:t>
+            </a:r>
+          </a:p>
+          <a:p>
+            <a:r>
+              <a:rPr lang="en-NZ" dirty="0"/>
+              <a:t>Shock lasts for two periods, and fiscal and monetary choices are made over both.</a:t>
+            </a:r>
+          </a:p>
+          <a:p>
+            <a:r>
+              <a:rPr lang="en-NZ" dirty="0"/>
+              <a:t>The </a:t>
+            </a:r>
+            <a:r>
+              <a:rPr lang="en-NZ" i="1" dirty="0"/>
+              <a:t>intertemporal link</a:t>
+            </a:r>
+            <a:r>
+              <a:rPr lang="en-NZ" dirty="0"/>
+              <a:t> between choices is the cost of adjusting for the policy chosen in the first period.</a:t>
+            </a:r>
+          </a:p>
+          <a:p>
+            <a:r>
+              <a:rPr lang="en-NZ" b="1" dirty="0"/>
+              <a:t>Note</a:t>
+            </a:r>
+            <a:r>
+              <a:rPr lang="en-NZ" dirty="0"/>
+              <a:t>: The purpose of this example is to show the link, we are now solving the infinite horizon game to understand this more fully.</a:t>
+            </a:r>
+            <a:endParaRPr lang="en-NZ" b="1" dirty="0"/>
           </a:p>
         </p:txBody>
       </p:sp>
@@ -15540,10 +15764,65 @@
         </p:nvSpPr>
         <p:spPr/>
         <p:txBody>
-          <a:bodyPr/>
+          <a:bodyPr>
+            <a:normAutofit fontScale="85000" lnSpcReduction="20000"/>
+          </a:bodyPr>
           <a:lstStyle/>
           <a:p>
-            <a:endParaRPr lang="en-NZ"/>
+            <a:pPr marL="0" indent="0">
+              <a:buNone/>
+            </a:pPr>
+            <a:r>
+              <a:rPr lang="en-NZ" b="1" dirty="0"/>
+              <a:t>Findings</a:t>
+            </a:r>
+          </a:p>
+          <a:p>
+            <a:r>
+              <a:rPr lang="en-NZ" dirty="0"/>
+              <a:t>Demand shock:</a:t>
+            </a:r>
+          </a:p>
+          <a:p>
+            <a:pPr lvl="1"/>
+            <a:r>
+              <a:rPr lang="en-NZ" dirty="0"/>
+              <a:t>Leads to lower output and inflation than NE.</a:t>
+            </a:r>
+          </a:p>
+          <a:p>
+            <a:pPr lvl="1"/>
+            <a:r>
+              <a:rPr lang="en-NZ" dirty="0"/>
+              <a:t>Both agents use “cost of adjustment” to pre-commit to lower policy easing.</a:t>
+            </a:r>
+          </a:p>
+          <a:p>
+            <a:r>
+              <a:rPr lang="en-NZ" dirty="0"/>
+              <a:t>Supply shock:</a:t>
+            </a:r>
+          </a:p>
+          <a:p>
+            <a:pPr lvl="1"/>
+            <a:r>
+              <a:rPr lang="en-NZ" dirty="0"/>
+              <a:t>Coordination, NE, and pre-commitment generate same inflation and output (given symmetric impact on objectives).</a:t>
+            </a:r>
+          </a:p>
+          <a:p>
+            <a:pPr lvl="1"/>
+            <a:r>
+              <a:rPr lang="en-NZ" dirty="0"/>
+              <a:t>However, precommitment limits the size of the policy adjustment by both agents.</a:t>
+            </a:r>
+          </a:p>
+          <a:p>
+            <a:pPr lvl="1"/>
+            <a:r>
+              <a:rPr lang="en-NZ" dirty="0"/>
+              <a:t>Improves welfare, but still has more policy change than cooperative outcome.</a:t>
+            </a:r>
           </a:p>
         </p:txBody>
       </p:sp>
@@ -15579,6 +15858,242 @@
       </p:grpSpPr>
       <p:sp>
         <p:nvSpPr>
+          <p:cNvPr id="2" name="Title 1">
+            <a:extLst>
+              <a:ext uri="{FF2B5EF4-FFF2-40B4-BE49-F238E27FC236}">
+                <a16:creationId xmlns:a16="http://schemas.microsoft.com/office/drawing/2014/main" id="{B483358D-CEBF-4653-C0E1-26237DDB4FB5}"/>
+              </a:ext>
+            </a:extLst>
+          </p:cNvPr>
+          <p:cNvSpPr>
+            <a:spLocks noGrp="1"/>
+          </p:cNvSpPr>
+          <p:nvPr>
+            <p:ph type="title"/>
+          </p:nvPr>
+        </p:nvSpPr>
+        <p:spPr/>
+        <p:txBody>
+          <a:bodyPr/>
+          <a:lstStyle/>
+          <a:p>
+            <a:r>
+              <a:rPr lang="en-AU" dirty="0"/>
+              <a:t>Early two-choice results (demand shock)</a:t>
+            </a:r>
+          </a:p>
+        </p:txBody>
+      </p:sp>
+      <p:sp>
+        <p:nvSpPr>
+          <p:cNvPr id="5" name="Content Placeholder 4">
+            <a:extLst>
+              <a:ext uri="{FF2B5EF4-FFF2-40B4-BE49-F238E27FC236}">
+                <a16:creationId xmlns:a16="http://schemas.microsoft.com/office/drawing/2014/main" id="{43FFA041-A3F6-61CA-E81E-B11188F62A09}"/>
+              </a:ext>
+            </a:extLst>
+          </p:cNvPr>
+          <p:cNvSpPr>
+            <a:spLocks noGrp="1"/>
+          </p:cNvSpPr>
+          <p:nvPr>
+            <p:ph sz="half" idx="1"/>
+          </p:nvPr>
+        </p:nvSpPr>
+        <p:spPr/>
+        <p:txBody>
+          <a:bodyPr/>
+          <a:lstStyle/>
+          <a:p>
+            <a:endParaRPr lang="en-AU"/>
+          </a:p>
+        </p:txBody>
+      </p:sp>
+      <p:sp>
+        <p:nvSpPr>
+          <p:cNvPr id="8" name="Content Placeholder 7">
+            <a:extLst>
+              <a:ext uri="{FF2B5EF4-FFF2-40B4-BE49-F238E27FC236}">
+                <a16:creationId xmlns:a16="http://schemas.microsoft.com/office/drawing/2014/main" id="{C1CACB0C-5228-E744-1E8B-CFAF4223724F}"/>
+              </a:ext>
+            </a:extLst>
+          </p:cNvPr>
+          <p:cNvSpPr>
+            <a:spLocks noGrp="1"/>
+          </p:cNvSpPr>
+          <p:nvPr>
+            <p:ph sz="half" idx="2"/>
+          </p:nvPr>
+        </p:nvSpPr>
+        <p:spPr/>
+        <p:txBody>
+          <a:bodyPr/>
+          <a:lstStyle/>
+          <a:p>
+            <a:endParaRPr lang="en-AU"/>
+          </a:p>
+        </p:txBody>
+      </p:sp>
+    </p:spTree>
+    <p:extLst>
+      <p:ext uri="{BB962C8B-B14F-4D97-AF65-F5344CB8AC3E}">
+        <p14:creationId xmlns:p14="http://schemas.microsoft.com/office/powerpoint/2010/main" val="1545722245"/>
+      </p:ext>
+    </p:extLst>
+  </p:cSld>
+  <p:clrMapOvr>
+    <a:masterClrMapping/>
+  </p:clrMapOvr>
+</p:sld>
+</file>
+
+<file path=ppt/slides/slide26.xml><?xml version="1.0" encoding="utf-8"?>
+<p:sld xmlns:a="http://schemas.openxmlformats.org/drawingml/2006/main" xmlns:r="http://schemas.openxmlformats.org/officeDocument/2006/relationships" xmlns:p="http://schemas.openxmlformats.org/presentationml/2006/main">
+  <p:cSld>
+    <p:spTree>
+      <p:nvGrpSpPr>
+        <p:cNvPr id="1" name=""/>
+        <p:cNvGrpSpPr/>
+        <p:nvPr/>
+      </p:nvGrpSpPr>
+      <p:grpSpPr>
+        <a:xfrm>
+          <a:off x="0" y="0"/>
+          <a:ext cx="0" cy="0"/>
+          <a:chOff x="0" y="0"/>
+          <a:chExt cx="0" cy="0"/>
+        </a:xfrm>
+      </p:grpSpPr>
+      <p:sp>
+        <p:nvSpPr>
+          <p:cNvPr id="2" name="Title 1">
+            <a:extLst>
+              <a:ext uri="{FF2B5EF4-FFF2-40B4-BE49-F238E27FC236}">
+                <a16:creationId xmlns:a16="http://schemas.microsoft.com/office/drawing/2014/main" id="{B483358D-CEBF-4653-C0E1-26237DDB4FB5}"/>
+              </a:ext>
+            </a:extLst>
+          </p:cNvPr>
+          <p:cNvSpPr>
+            <a:spLocks noGrp="1"/>
+          </p:cNvSpPr>
+          <p:nvPr>
+            <p:ph type="title"/>
+          </p:nvPr>
+        </p:nvSpPr>
+        <p:spPr/>
+        <p:txBody>
+          <a:bodyPr/>
+          <a:lstStyle/>
+          <a:p>
+            <a:r>
+              <a:rPr lang="en-AU" dirty="0"/>
+              <a:t>Initial dynamic game (same simple model)</a:t>
+            </a:r>
+          </a:p>
+        </p:txBody>
+      </p:sp>
+      <p:pic>
+        <p:nvPicPr>
+          <p:cNvPr id="4" name="Content Placeholder 3">
+            <a:extLst>
+              <a:ext uri="{FF2B5EF4-FFF2-40B4-BE49-F238E27FC236}">
+                <a16:creationId xmlns:a16="http://schemas.microsoft.com/office/drawing/2014/main" id="{4B9A8279-A20B-1EC3-7D31-CDF63F08E5CF}"/>
+              </a:ext>
+            </a:extLst>
+          </p:cNvPr>
+          <p:cNvPicPr>
+            <a:picLocks noGrp="1" noChangeAspect="1"/>
+          </p:cNvPicPr>
+          <p:nvPr>
+            <p:ph sz="half" idx="1"/>
+          </p:nvPr>
+        </p:nvPicPr>
+        <p:blipFill>
+          <a:blip r:embed="rId3"/>
+          <a:stretch>
+            <a:fillRect/>
+          </a:stretch>
+        </p:blipFill>
+        <p:spPr>
+          <a:xfrm>
+            <a:off x="312738" y="1247082"/>
+            <a:ext cx="4175125" cy="2819198"/>
+          </a:xfrm>
+        </p:spPr>
+      </p:pic>
+      <p:sp>
+        <p:nvSpPr>
+          <p:cNvPr id="8" name="Content Placeholder 7">
+            <a:extLst>
+              <a:ext uri="{FF2B5EF4-FFF2-40B4-BE49-F238E27FC236}">
+                <a16:creationId xmlns:a16="http://schemas.microsoft.com/office/drawing/2014/main" id="{C1CACB0C-5228-E744-1E8B-CFAF4223724F}"/>
+              </a:ext>
+            </a:extLst>
+          </p:cNvPr>
+          <p:cNvSpPr>
+            <a:spLocks noGrp="1"/>
+          </p:cNvSpPr>
+          <p:nvPr>
+            <p:ph sz="half" idx="2"/>
+          </p:nvPr>
+        </p:nvSpPr>
+        <p:spPr/>
+        <p:txBody>
+          <a:bodyPr/>
+          <a:lstStyle/>
+          <a:p>
+            <a:r>
+              <a:rPr lang="en-US" dirty="0"/>
+              <a:t>Demand persistently “too low”, such that inflation is below target but output at target.</a:t>
+            </a:r>
+          </a:p>
+          <a:p>
+            <a:r>
+              <a:rPr lang="en-US" dirty="0"/>
+              <a:t>Policy makers “offset” each other – with adjustment cost constraining how far they move each period.</a:t>
+            </a:r>
+          </a:p>
+          <a:p>
+            <a:r>
+              <a:rPr lang="en-US" b="1" dirty="0"/>
+              <a:t>Fiscal dominance?</a:t>
+            </a:r>
+            <a:endParaRPr lang="en-AU" b="1" dirty="0"/>
+          </a:p>
+        </p:txBody>
+      </p:sp>
+    </p:spTree>
+    <p:extLst>
+      <p:ext uri="{BB962C8B-B14F-4D97-AF65-F5344CB8AC3E}">
+        <p14:creationId xmlns:p14="http://schemas.microsoft.com/office/powerpoint/2010/main" val="4008033440"/>
+      </p:ext>
+    </p:extLst>
+  </p:cSld>
+  <p:clrMapOvr>
+    <a:masterClrMapping/>
+  </p:clrMapOvr>
+</p:sld>
+</file>
+
+<file path=ppt/slides/slide27.xml><?xml version="1.0" encoding="utf-8"?>
+<p:sld xmlns:a="http://schemas.openxmlformats.org/drawingml/2006/main" xmlns:r="http://schemas.openxmlformats.org/officeDocument/2006/relationships" xmlns:p="http://schemas.openxmlformats.org/presentationml/2006/main">
+  <p:cSld>
+    <p:spTree>
+      <p:nvGrpSpPr>
+        <p:cNvPr id="1" name=""/>
+        <p:cNvGrpSpPr/>
+        <p:nvPr/>
+      </p:nvGrpSpPr>
+      <p:grpSpPr>
+        <a:xfrm>
+          <a:off x="0" y="0"/>
+          <a:ext cx="0" cy="0"/>
+          <a:chOff x="0" y="0"/>
+          <a:chExt cx="0" cy="0"/>
+        </a:xfrm>
+      </p:grpSpPr>
+      <p:sp>
+        <p:nvSpPr>
           <p:cNvPr id="2" name="Title 1"/>
           <p:cNvSpPr>
             <a:spLocks noGrp="1"/>
@@ -15678,7 +16193,7 @@
 </p:sld>
 </file>
 
-<file path=ppt/slides/slide26.xml><?xml version="1.0" encoding="utf-8"?>
+<file path=ppt/slides/slide28.xml><?xml version="1.0" encoding="utf-8"?>
 <p:sld xmlns:a="http://schemas.openxmlformats.org/drawingml/2006/main" xmlns:r="http://schemas.openxmlformats.org/officeDocument/2006/relationships" xmlns:p="http://schemas.openxmlformats.org/presentationml/2006/main">
   <p:cSld>
     <p:spTree>
@@ -16867,8 +17382,8 @@
           </a:p>
         </p:txBody>
       </p:sp>
-      <mc:AlternateContent xmlns:mc="http://schemas.openxmlformats.org/markup-compatibility/2006">
-        <mc:Choice xmlns:a14="http://schemas.microsoft.com/office/drawing/2010/main" Requires="a14">
+      <mc:AlternateContent xmlns:mc="http://schemas.openxmlformats.org/markup-compatibility/2006" xmlns:a14="http://schemas.microsoft.com/office/drawing/2010/main">
+        <mc:Choice Requires="a14">
           <p:sp>
             <p:nvSpPr>
               <p:cNvPr id="3" name="Content Placeholder 2">
@@ -17298,7 +17813,7 @@
             </p:txBody>
           </p:sp>
         </mc:Choice>
-        <mc:Fallback>
+        <mc:Fallback xmlns="">
           <p:sp>
             <p:nvSpPr>
               <p:cNvPr id="3" name="Content Placeholder 2">

</xml_diff>

<commit_message>
slide and game update
</commit_message>
<xml_diff>
--- a/MF coordination/SI_game/Monetary and Fiscal Policy Coordination.pptx
+++ b/MF coordination/SI_game/Monetary and Fiscal Policy Coordination.pptx
@@ -5,10 +5,10 @@
     <p:sldMasterId id="2147483650" r:id="rId1"/>
   </p:sldMasterIdLst>
   <p:notesMasterIdLst>
-    <p:notesMasterId r:id="rId30"/>
+    <p:notesMasterId r:id="rId31"/>
   </p:notesMasterIdLst>
   <p:handoutMasterIdLst>
-    <p:handoutMasterId r:id="rId31"/>
+    <p:handoutMasterId r:id="rId32"/>
   </p:handoutMasterIdLst>
   <p:sldIdLst>
     <p:sldId id="256" r:id="rId2"/>
@@ -37,8 +37,9 @@
     <p:sldId id="292" r:id="rId25"/>
     <p:sldId id="295" r:id="rId26"/>
     <p:sldId id="296" r:id="rId27"/>
-    <p:sldId id="261" r:id="rId28"/>
-    <p:sldId id="262" r:id="rId29"/>
+    <p:sldId id="297" r:id="rId28"/>
+    <p:sldId id="261" r:id="rId29"/>
+    <p:sldId id="262" r:id="rId30"/>
   </p:sldIdLst>
   <p:sldSz cx="9144000" cy="5143500" type="screen16x9"/>
   <p:notesSz cx="6797675" cy="9928225"/>
@@ -4245,7 +4246,13 @@
   <p:cSld>
     <p:spTree>
       <p:nvGrpSpPr>
-        <p:cNvPr id="1" name=""/>
+        <p:cNvPr id="1" name="">
+          <a:extLst>
+            <a:ext uri="{FF2B5EF4-FFF2-40B4-BE49-F238E27FC236}">
+              <a16:creationId xmlns:a16="http://schemas.microsoft.com/office/drawing/2014/main" id="{994822FB-10A1-AF08-4892-702E2AC8916C}"/>
+            </a:ext>
+          </a:extLst>
+        </p:cNvPr>
         <p:cNvGrpSpPr/>
         <p:nvPr/>
       </p:nvGrpSpPr>
@@ -4259,7 +4266,13 @@
       </p:grpSpPr>
       <p:sp>
         <p:nvSpPr>
-          <p:cNvPr id="2" name="Slide Image Placeholder 1"/>
+          <p:cNvPr id="2" name="Slide Image Placeholder 1">
+            <a:extLst>
+              <a:ext uri="{FF2B5EF4-FFF2-40B4-BE49-F238E27FC236}">
+                <a16:creationId xmlns:a16="http://schemas.microsoft.com/office/drawing/2014/main" id="{6E60B5B7-A6B5-4744-4FAD-3B5142971E24}"/>
+              </a:ext>
+            </a:extLst>
+          </p:cNvPr>
           <p:cNvSpPr>
             <a:spLocks noGrp="1" noRot="1" noChangeAspect="1"/>
           </p:cNvSpPr>
@@ -4271,7 +4284,13 @@
       </p:sp>
       <p:sp>
         <p:nvSpPr>
-          <p:cNvPr id="3" name="Notes Placeholder 2"/>
+          <p:cNvPr id="3" name="Notes Placeholder 2">
+            <a:extLst>
+              <a:ext uri="{FF2B5EF4-FFF2-40B4-BE49-F238E27FC236}">
+                <a16:creationId xmlns:a16="http://schemas.microsoft.com/office/drawing/2014/main" id="{EA893FD6-166C-6F73-606A-738F812F2395}"/>
+              </a:ext>
+            </a:extLst>
+          </p:cNvPr>
           <p:cNvSpPr>
             <a:spLocks noGrp="1"/>
           </p:cNvSpPr>
@@ -4284,41 +4303,24 @@
           <a:bodyPr/>
           <a:lstStyle/>
           <a:p>
-            <a:pPr marL="0" marR="0" lvl="0" indent="0" algn="l" defTabSz="914400" rtl="0" eaLnBrk="0" fontAlgn="base" latinLnBrk="0" hangingPunct="0">
-              <a:lnSpc>
-                <a:spcPct val="100000"/>
-              </a:lnSpc>
-              <a:spcBef>
-                <a:spcPct val="30000"/>
-              </a:spcBef>
-              <a:spcAft>
-                <a:spcPct val="0"/>
-              </a:spcAft>
-              <a:buClrTx/>
-              <a:buSzTx/>
-              <a:buFontTx/>
-              <a:buNone/>
-              <a:tabLst/>
-              <a:defRPr/>
-            </a:pPr>
-            <a:r>
-              <a:rPr lang="en-US" dirty="0"/>
-              <a:t>“prisoners dilemma” , where both monetary and fiscal authorities would have been better off if they had not tried to counteract each others policy. </a:t>
-            </a:r>
-          </a:p>
-          <a:p>
-            <a:endParaRPr lang="en-AU" dirty="0"/>
-          </a:p>
-        </p:txBody>
-      </p:sp>
-      <p:sp>
-        <p:nvSpPr>
-          <p:cNvPr id="4" name="Slide Number Placeholder 3"/>
+            <a:endParaRPr lang="en-NZ" dirty="0"/>
+          </a:p>
+        </p:txBody>
+      </p:sp>
+      <p:sp>
+        <p:nvSpPr>
+          <p:cNvPr id="4" name="Slide Number Placeholder 3">
+            <a:extLst>
+              <a:ext uri="{FF2B5EF4-FFF2-40B4-BE49-F238E27FC236}">
+                <a16:creationId xmlns:a16="http://schemas.microsoft.com/office/drawing/2014/main" id="{A7AF5855-D558-EE1E-FEFC-325AD97A4ACE}"/>
+              </a:ext>
+            </a:extLst>
+          </p:cNvPr>
           <p:cNvSpPr>
             <a:spLocks noGrp="1"/>
           </p:cNvSpPr>
           <p:nvPr>
-            <p:ph type="sldNum" sz="quarter" idx="10"/>
+            <p:ph type="sldNum" sz="quarter" idx="5"/>
           </p:nvPr>
         </p:nvSpPr>
         <p:spPr/>
@@ -4338,7 +4340,7 @@
     </p:spTree>
     <p:extLst>
       <p:ext uri="{BB962C8B-B14F-4D97-AF65-F5344CB8AC3E}">
-        <p14:creationId xmlns:p14="http://schemas.microsoft.com/office/powerpoint/2010/main" val="2687625394"/>
+        <p14:creationId xmlns:p14="http://schemas.microsoft.com/office/powerpoint/2010/main" val="3310136443"/>
       </p:ext>
     </p:extLst>
   </p:cSld>
@@ -4392,7 +4394,30 @@
           <a:bodyPr/>
           <a:lstStyle/>
           <a:p>
-            <a:endParaRPr lang="en-AU"/>
+            <a:pPr marL="0" marR="0" lvl="0" indent="0" algn="l" defTabSz="914400" rtl="0" eaLnBrk="0" fontAlgn="base" latinLnBrk="0" hangingPunct="0">
+              <a:lnSpc>
+                <a:spcPct val="100000"/>
+              </a:lnSpc>
+              <a:spcBef>
+                <a:spcPct val="30000"/>
+              </a:spcBef>
+              <a:spcAft>
+                <a:spcPct val="0"/>
+              </a:spcAft>
+              <a:buClrTx/>
+              <a:buSzTx/>
+              <a:buFontTx/>
+              <a:buNone/>
+              <a:tabLst/>
+              <a:defRPr/>
+            </a:pPr>
+            <a:r>
+              <a:rPr lang="en-US" dirty="0"/>
+              <a:t>“prisoners dilemma” , where both monetary and fiscal authorities would have been better off if they had not tried to counteract each others policy. </a:t>
+            </a:r>
+          </a:p>
+          <a:p>
+            <a:endParaRPr lang="en-AU" dirty="0"/>
           </a:p>
         </p:txBody>
       </p:sp>
@@ -4415,6 +4440,91 @@
               <a:rPr lang="en-AU" smtClean="0"/>
               <a:pPr/>
               <a:t>28</a:t>
+            </a:fld>
+            <a:endParaRPr lang="en-AU"/>
+          </a:p>
+        </p:txBody>
+      </p:sp>
+    </p:spTree>
+    <p:extLst>
+      <p:ext uri="{BB962C8B-B14F-4D97-AF65-F5344CB8AC3E}">
+        <p14:creationId xmlns:p14="http://schemas.microsoft.com/office/powerpoint/2010/main" val="2687625394"/>
+      </p:ext>
+    </p:extLst>
+  </p:cSld>
+  <p:clrMapOvr>
+    <a:masterClrMapping/>
+  </p:clrMapOvr>
+</p:notes>
+</file>
+
+<file path=ppt/notesSlides/notesSlide26.xml><?xml version="1.0" encoding="utf-8"?>
+<p:notes xmlns:a="http://schemas.openxmlformats.org/drawingml/2006/main" xmlns:r="http://schemas.openxmlformats.org/officeDocument/2006/relationships" xmlns:p="http://schemas.openxmlformats.org/presentationml/2006/main">
+  <p:cSld>
+    <p:spTree>
+      <p:nvGrpSpPr>
+        <p:cNvPr id="1" name=""/>
+        <p:cNvGrpSpPr/>
+        <p:nvPr/>
+      </p:nvGrpSpPr>
+      <p:grpSpPr>
+        <a:xfrm>
+          <a:off x="0" y="0"/>
+          <a:ext cx="0" cy="0"/>
+          <a:chOff x="0" y="0"/>
+          <a:chExt cx="0" cy="0"/>
+        </a:xfrm>
+      </p:grpSpPr>
+      <p:sp>
+        <p:nvSpPr>
+          <p:cNvPr id="2" name="Slide Image Placeholder 1"/>
+          <p:cNvSpPr>
+            <a:spLocks noGrp="1" noRot="1" noChangeAspect="1"/>
+          </p:cNvSpPr>
+          <p:nvPr>
+            <p:ph type="sldImg"/>
+          </p:nvPr>
+        </p:nvSpPr>
+        <p:spPr/>
+      </p:sp>
+      <p:sp>
+        <p:nvSpPr>
+          <p:cNvPr id="3" name="Notes Placeholder 2"/>
+          <p:cNvSpPr>
+            <a:spLocks noGrp="1"/>
+          </p:cNvSpPr>
+          <p:nvPr>
+            <p:ph type="body" idx="1"/>
+          </p:nvPr>
+        </p:nvSpPr>
+        <p:spPr/>
+        <p:txBody>
+          <a:bodyPr/>
+          <a:lstStyle/>
+          <a:p>
+            <a:endParaRPr lang="en-AU"/>
+          </a:p>
+        </p:txBody>
+      </p:sp>
+      <p:sp>
+        <p:nvSpPr>
+          <p:cNvPr id="4" name="Slide Number Placeholder 3"/>
+          <p:cNvSpPr>
+            <a:spLocks noGrp="1"/>
+          </p:cNvSpPr>
+          <p:nvPr>
+            <p:ph type="sldNum" sz="quarter" idx="10"/>
+          </p:nvPr>
+        </p:nvSpPr>
+        <p:spPr/>
+        <p:txBody>
+          <a:bodyPr/>
+          <a:lstStyle/>
+          <a:p>
+            <a:fld id="{22FC436C-5653-4517-9B94-0BB68ACE2454}" type="slidenum">
+              <a:rPr lang="en-AU" smtClean="0"/>
+              <a:pPr/>
+              <a:t>29</a:t>
             </a:fld>
             <a:endParaRPr lang="en-AU"/>
           </a:p>
@@ -15992,35 +16102,6 @@
           </a:p>
         </p:txBody>
       </p:sp>
-      <p:pic>
-        <p:nvPicPr>
-          <p:cNvPr id="4" name="Content Placeholder 3">
-            <a:extLst>
-              <a:ext uri="{FF2B5EF4-FFF2-40B4-BE49-F238E27FC236}">
-                <a16:creationId xmlns:a16="http://schemas.microsoft.com/office/drawing/2014/main" id="{4B9A8279-A20B-1EC3-7D31-CDF63F08E5CF}"/>
-              </a:ext>
-            </a:extLst>
-          </p:cNvPr>
-          <p:cNvPicPr>
-            <a:picLocks noGrp="1" noChangeAspect="1"/>
-          </p:cNvPicPr>
-          <p:nvPr>
-            <p:ph sz="half" idx="1"/>
-          </p:nvPr>
-        </p:nvPicPr>
-        <p:blipFill>
-          <a:blip r:embed="rId3"/>
-          <a:stretch>
-            <a:fillRect/>
-          </a:stretch>
-        </p:blipFill>
-        <p:spPr>
-          <a:xfrm>
-            <a:off x="312738" y="1247082"/>
-            <a:ext cx="4175125" cy="2819198"/>
-          </a:xfrm>
-        </p:spPr>
-      </p:pic>
       <p:sp>
         <p:nvSpPr>
           <p:cNvPr id="8" name="Content Placeholder 7">
@@ -16055,6 +16136,20 @@
           </a:p>
           <a:p>
             <a:r>
+              <a:rPr lang="en-US" dirty="0"/>
+              <a:t>Convergence relies on a </a:t>
+            </a:r>
+            <a:r>
+              <a:rPr lang="en-US" i="1" dirty="0"/>
+              <a:t>penalty from neutral</a:t>
+            </a:r>
+            <a:r>
+              <a:rPr lang="en-US" dirty="0"/>
+              <a:t>.</a:t>
+            </a:r>
+          </a:p>
+          <a:p>
+            <a:r>
               <a:rPr lang="en-US" b="1" dirty="0"/>
               <a:t>Fiscal dominance?</a:t>
             </a:r>
@@ -16062,6 +16157,35 @@
           </a:p>
         </p:txBody>
       </p:sp>
+      <p:pic>
+        <p:nvPicPr>
+          <p:cNvPr id="7" name="Content Placeholder 6" descr="A graph of a government and central bank policy&#10;&#10;Description automatically generated">
+            <a:extLst>
+              <a:ext uri="{FF2B5EF4-FFF2-40B4-BE49-F238E27FC236}">
+                <a16:creationId xmlns:a16="http://schemas.microsoft.com/office/drawing/2014/main" id="{C0424A18-9626-C45D-8B33-77DB459E35C2}"/>
+              </a:ext>
+            </a:extLst>
+          </p:cNvPr>
+          <p:cNvPicPr>
+            <a:picLocks noGrp="1" noChangeAspect="1"/>
+          </p:cNvPicPr>
+          <p:nvPr>
+            <p:ph sz="half" idx="1"/>
+          </p:nvPr>
+        </p:nvPicPr>
+        <p:blipFill>
+          <a:blip r:embed="rId3"/>
+          <a:stretch>
+            <a:fillRect/>
+          </a:stretch>
+        </p:blipFill>
+        <p:spPr>
+          <a:xfrm>
+            <a:off x="312738" y="1264973"/>
+            <a:ext cx="4175125" cy="2783416"/>
+          </a:xfrm>
+        </p:spPr>
+      </p:pic>
     </p:spTree>
     <p:extLst>
       <p:ext uri="{BB962C8B-B14F-4D97-AF65-F5344CB8AC3E}">
@@ -16080,6 +16204,128 @@
   <p:cSld>
     <p:spTree>
       <p:nvGrpSpPr>
+        <p:cNvPr id="1" name="">
+          <a:extLst>
+            <a:ext uri="{FF2B5EF4-FFF2-40B4-BE49-F238E27FC236}">
+              <a16:creationId xmlns:a16="http://schemas.microsoft.com/office/drawing/2014/main" id="{CAF5E232-F129-D290-1916-D2F2DA681CC0}"/>
+            </a:ext>
+          </a:extLst>
+        </p:cNvPr>
+        <p:cNvGrpSpPr/>
+        <p:nvPr/>
+      </p:nvGrpSpPr>
+      <p:grpSpPr>
+        <a:xfrm>
+          <a:off x="0" y="0"/>
+          <a:ext cx="0" cy="0"/>
+          <a:chOff x="0" y="0"/>
+          <a:chExt cx="0" cy="0"/>
+        </a:xfrm>
+      </p:grpSpPr>
+      <p:sp>
+        <p:nvSpPr>
+          <p:cNvPr id="2" name="Title 1">
+            <a:extLst>
+              <a:ext uri="{FF2B5EF4-FFF2-40B4-BE49-F238E27FC236}">
+                <a16:creationId xmlns:a16="http://schemas.microsoft.com/office/drawing/2014/main" id="{7B6A37E3-0A52-33A3-3A65-5285D84FD6F1}"/>
+              </a:ext>
+            </a:extLst>
+          </p:cNvPr>
+          <p:cNvSpPr>
+            <a:spLocks noGrp="1"/>
+          </p:cNvSpPr>
+          <p:nvPr>
+            <p:ph type="title"/>
+          </p:nvPr>
+        </p:nvSpPr>
+        <p:spPr/>
+        <p:txBody>
+          <a:bodyPr/>
+          <a:lstStyle/>
+          <a:p>
+            <a:r>
+              <a:rPr lang="en-AU" dirty="0"/>
+              <a:t>Initial dynamic game (same simple model)</a:t>
+            </a:r>
+          </a:p>
+        </p:txBody>
+      </p:sp>
+      <p:pic>
+        <p:nvPicPr>
+          <p:cNvPr id="10" name="Content Placeholder 9" descr="A graph with a line&#10;&#10;Description automatically generated">
+            <a:extLst>
+              <a:ext uri="{FF2B5EF4-FFF2-40B4-BE49-F238E27FC236}">
+                <a16:creationId xmlns:a16="http://schemas.microsoft.com/office/drawing/2014/main" id="{A0B4DBE6-5D9E-B9E4-5C57-6F83484C694B}"/>
+              </a:ext>
+            </a:extLst>
+          </p:cNvPr>
+          <p:cNvPicPr>
+            <a:picLocks noGrp="1" noChangeAspect="1"/>
+          </p:cNvPicPr>
+          <p:nvPr>
+            <p:ph sz="half" idx="2"/>
+          </p:nvPr>
+        </p:nvPicPr>
+        <p:blipFill>
+          <a:blip r:embed="rId3"/>
+          <a:stretch>
+            <a:fillRect/>
+          </a:stretch>
+        </p:blipFill>
+        <p:spPr>
+          <a:xfrm>
+            <a:off x="4657725" y="1264444"/>
+            <a:ext cx="4176713" cy="2784475"/>
+          </a:xfrm>
+        </p:spPr>
+      </p:pic>
+      <p:pic>
+        <p:nvPicPr>
+          <p:cNvPr id="6" name="Content Placeholder 5" descr="A graph of a line graph&#10;&#10;Description automatically generated with medium confidence">
+            <a:extLst>
+              <a:ext uri="{FF2B5EF4-FFF2-40B4-BE49-F238E27FC236}">
+                <a16:creationId xmlns:a16="http://schemas.microsoft.com/office/drawing/2014/main" id="{969EFF35-893E-2B71-FC51-9151E1347A78}"/>
+              </a:ext>
+            </a:extLst>
+          </p:cNvPr>
+          <p:cNvPicPr>
+            <a:picLocks noGrp="1" noChangeAspect="1"/>
+          </p:cNvPicPr>
+          <p:nvPr>
+            <p:ph sz="half" idx="1"/>
+          </p:nvPr>
+        </p:nvPicPr>
+        <p:blipFill>
+          <a:blip r:embed="rId4"/>
+          <a:stretch>
+            <a:fillRect/>
+          </a:stretch>
+        </p:blipFill>
+        <p:spPr>
+          <a:xfrm>
+            <a:off x="312738" y="1264973"/>
+            <a:ext cx="4175125" cy="2783416"/>
+          </a:xfrm>
+        </p:spPr>
+      </p:pic>
+    </p:spTree>
+    <p:extLst>
+      <p:ext uri="{BB962C8B-B14F-4D97-AF65-F5344CB8AC3E}">
+        <p14:creationId xmlns:p14="http://schemas.microsoft.com/office/powerpoint/2010/main" val="1312562486"/>
+      </p:ext>
+    </p:extLst>
+  </p:cSld>
+  <p:clrMapOvr>
+    <a:masterClrMapping/>
+  </p:clrMapOvr>
+</p:sld>
+</file>
+
+<file path=ppt/slides/slide28.xml><?xml version="1.0" encoding="utf-8"?>
+<p:sld xmlns:a="http://schemas.openxmlformats.org/drawingml/2006/main" xmlns:r="http://schemas.openxmlformats.org/officeDocument/2006/relationships" xmlns:p="http://schemas.openxmlformats.org/presentationml/2006/main">
+  <p:cSld>
+    <p:spTree>
+      <p:nvGrpSpPr>
         <p:cNvPr id="1" name=""/>
         <p:cNvGrpSpPr/>
         <p:nvPr/>
@@ -16193,7 +16439,7 @@
 </p:sld>
 </file>
 
-<file path=ppt/slides/slide28.xml><?xml version="1.0" encoding="utf-8"?>
+<file path=ppt/slides/slide29.xml><?xml version="1.0" encoding="utf-8"?>
 <p:sld xmlns:a="http://schemas.openxmlformats.org/drawingml/2006/main" xmlns:r="http://schemas.openxmlformats.org/officeDocument/2006/relationships" xmlns:p="http://schemas.openxmlformats.org/presentationml/2006/main">
   <p:cSld>
     <p:spTree>

</xml_diff>

<commit_message>
updating MF paper code
</commit_message>
<xml_diff>
--- a/MF coordination/SI_game/Monetary and Fiscal Policy Coordination.pptx
+++ b/MF coordination/SI_game/Monetary and Fiscal Policy Coordination.pptx
@@ -5,10 +5,10 @@
     <p:sldMasterId id="2147483650" r:id="rId1"/>
   </p:sldMasterIdLst>
   <p:notesMasterIdLst>
-    <p:notesMasterId r:id="rId34"/>
+    <p:notesMasterId r:id="rId37"/>
   </p:notesMasterIdLst>
   <p:handoutMasterIdLst>
-    <p:handoutMasterId r:id="rId35"/>
+    <p:handoutMasterId r:id="rId38"/>
   </p:handoutMasterIdLst>
   <p:sldIdLst>
     <p:sldId id="256" r:id="rId2"/>
@@ -24,25 +24,28 @@
     <p:sldId id="288" r:id="rId12"/>
     <p:sldId id="286" r:id="rId13"/>
     <p:sldId id="269" r:id="rId14"/>
-    <p:sldId id="291" r:id="rId15"/>
-    <p:sldId id="273" r:id="rId16"/>
-    <p:sldId id="276" r:id="rId17"/>
-    <p:sldId id="270" r:id="rId18"/>
-    <p:sldId id="274" r:id="rId19"/>
-    <p:sldId id="275" r:id="rId20"/>
-    <p:sldId id="271" r:id="rId21"/>
-    <p:sldId id="277" r:id="rId22"/>
-    <p:sldId id="278" r:id="rId23"/>
-    <p:sldId id="260" r:id="rId24"/>
-    <p:sldId id="292" r:id="rId25"/>
-    <p:sldId id="295" r:id="rId26"/>
-    <p:sldId id="296" r:id="rId27"/>
-    <p:sldId id="297" r:id="rId28"/>
-    <p:sldId id="300" r:id="rId29"/>
-    <p:sldId id="299" r:id="rId30"/>
-    <p:sldId id="301" r:id="rId31"/>
-    <p:sldId id="261" r:id="rId32"/>
-    <p:sldId id="262" r:id="rId33"/>
+    <p:sldId id="304" r:id="rId15"/>
+    <p:sldId id="291" r:id="rId16"/>
+    <p:sldId id="273" r:id="rId17"/>
+    <p:sldId id="276" r:id="rId18"/>
+    <p:sldId id="270" r:id="rId19"/>
+    <p:sldId id="274" r:id="rId20"/>
+    <p:sldId id="275" r:id="rId21"/>
+    <p:sldId id="271" r:id="rId22"/>
+    <p:sldId id="277" r:id="rId23"/>
+    <p:sldId id="278" r:id="rId24"/>
+    <p:sldId id="260" r:id="rId25"/>
+    <p:sldId id="292" r:id="rId26"/>
+    <p:sldId id="295" r:id="rId27"/>
+    <p:sldId id="296" r:id="rId28"/>
+    <p:sldId id="297" r:id="rId29"/>
+    <p:sldId id="300" r:id="rId30"/>
+    <p:sldId id="299" r:id="rId31"/>
+    <p:sldId id="301" r:id="rId32"/>
+    <p:sldId id="303" r:id="rId33"/>
+    <p:sldId id="305" r:id="rId34"/>
+    <p:sldId id="261" r:id="rId35"/>
+    <p:sldId id="262" r:id="rId36"/>
   </p:sldIdLst>
   <p:sldSz cx="9144000" cy="5143500" type="screen16x9"/>
   <p:notesSz cx="6797675" cy="9928225"/>
@@ -2237,7 +2240,7 @@
             <a:fld id="{72E6E50C-42F6-44F9-849C-F9C68685802B}" type="datetimeFigureOut">
               <a:rPr lang="en-AU" smtClean="0"/>
               <a:pPr/>
-              <a:t>26/11/2024</a:t>
+              <a:t>30/11/2024</a:t>
             </a:fld>
             <a:endParaRPr lang="en-AU"/>
           </a:p>
@@ -2413,7 +2416,7 @@
             <a:fld id="{746BCAF0-30A3-4E26-855A-16D175EBDECD}" type="datetime1">
               <a:rPr lang="en-AU"/>
               <a:pPr/>
-              <a:t>26/11/2024</a:t>
+              <a:t>30/11/2024</a:t>
             </a:fld>
             <a:endParaRPr lang="en-AU"/>
           </a:p>
@@ -3252,18 +3255,36 @@
           <a:lstStyle/>
           <a:p>
             <a:r>
-              <a:rPr lang="en-AU" dirty="0"/>
-              <a:t>Necessary to make responding to a shock costly, otherwise there is no Nash Equilibrium in this game.  We can view this as a form of “conservativeness” in behaviour, and in a more general macro-model this term won’t be necessary.</a:t>
-            </a:r>
-          </a:p>
-          <a:p>
-            <a:endParaRPr lang="en-AU" dirty="0"/>
-          </a:p>
-          <a:p>
-            <a:r>
-              <a:rPr lang="en-AU" dirty="0"/>
-              <a:t>When both instruments are set to zero, both inflation and output are below their target levels, which is why this is a “demand shock”.  We can imagine the game “started” with gamma and alpha at 2, and optimal policy at f = m = 0.</a:t>
-            </a:r>
+              <a:rPr lang="en-US" dirty="0"/>
+              <a:t>For the varying costs point can talk about the “cost of adjusting from a target interest rate”.</a:t>
+            </a:r>
+            <a:br>
+              <a:rPr lang="en-US" dirty="0"/>
+            </a:br>
+            <a:br>
+              <a:rPr lang="en-US" dirty="0"/>
+            </a:br>
+            <a:r>
+              <a:rPr lang="en-US" dirty="0"/>
+              <a:t>If that is zero in the demand shock then the </a:t>
+            </a:r>
+            <a:r>
+              <a:rPr lang="en-US" dirty="0" err="1"/>
+              <a:t>nash</a:t>
+            </a:r>
+            <a:r>
+              <a:rPr lang="en-US" dirty="0"/>
+              <a:t> equilibrium is still worse. But pre-commitment allows the cooperative equilibrium to be sustained.  If there are significant costs, then it leads to a WORSE </a:t>
+            </a:r>
+            <a:r>
+              <a:rPr lang="en-US" dirty="0" err="1"/>
+              <a:t>nash</a:t>
+            </a:r>
+            <a:r>
+              <a:rPr lang="en-US" dirty="0"/>
+              <a:t> equilibrium.</a:t>
+            </a:r>
+            <a:endParaRPr lang="en-NZ" dirty="0"/>
           </a:p>
         </p:txBody>
       </p:sp>
@@ -3294,7 +3315,7 @@
     </p:spTree>
     <p:extLst>
       <p:ext uri="{BB962C8B-B14F-4D97-AF65-F5344CB8AC3E}">
-        <p14:creationId xmlns:p14="http://schemas.microsoft.com/office/powerpoint/2010/main" val="3856256237"/>
+        <p14:creationId xmlns:p14="http://schemas.microsoft.com/office/powerpoint/2010/main" val="3114460998"/>
       </p:ext>
     </p:extLst>
   </p:cSld>
@@ -3349,60 +3370,18 @@
           <a:lstStyle/>
           <a:p>
             <a:r>
-              <a:rPr lang="en-US" dirty="0"/>
-              <a:t>Demand shock:</a:t>
-            </a:r>
-          </a:p>
-          <a:p>
-            <a:endParaRPr lang="en-US" dirty="0"/>
-          </a:p>
-          <a:p>
-            <a:pPr marL="228600" indent="-228600">
-              <a:buAutoNum type="arabicParenR"/>
-            </a:pPr>
-            <a:r>
-              <a:rPr lang="en-US" dirty="0"/>
-              <a:t>NE leads to less easing by both authorities after a demand shock.</a:t>
-            </a:r>
-          </a:p>
-          <a:p>
-            <a:pPr marL="228600" indent="-228600">
-              <a:buAutoNum type="arabicParenR"/>
-            </a:pPr>
-            <a:endParaRPr lang="en-US" dirty="0"/>
-          </a:p>
-          <a:p>
-            <a:pPr marL="228600" indent="-228600">
-              <a:buAutoNum type="arabicParenR"/>
-            </a:pPr>
-            <a:r>
-              <a:rPr lang="en-US" dirty="0"/>
-              <a:t>“Pre-commitment” or “leadership” generates worse outcomes – unlike the other literature (i.e. </a:t>
-            </a:r>
-            <a:r>
-              <a:rPr lang="en-US" dirty="0" err="1"/>
-              <a:t>Debelle</a:t>
-            </a:r>
-            <a:r>
-              <a:rPr lang="en-US" dirty="0"/>
-              <a:t> and Fischer 1994).  Why? Cost of policy adjustment generates a free-rider problem which gets worse with pre-commitment.</a:t>
-            </a:r>
-          </a:p>
-          <a:p>
-            <a:pPr marL="228600" indent="-228600">
-              <a:buAutoNum type="arabicParenR"/>
-            </a:pPr>
-            <a:endParaRPr lang="en-US" dirty="0"/>
-          </a:p>
-          <a:p>
-            <a:pPr marL="228600" indent="-228600">
-              <a:buAutoNum type="arabicParenR"/>
-            </a:pPr>
-            <a:r>
-              <a:rPr lang="en-US" dirty="0"/>
-              <a:t>The idea here is that equilibrium play leads to “conservative” play by both fiscal and monetary authorities.</a:t>
-            </a:r>
-            <a:endParaRPr lang="en-NZ" dirty="0"/>
+              <a:rPr lang="en-AU" dirty="0"/>
+              <a:t>Necessary to make responding to a shock costly, otherwise there is no Nash Equilibrium in this game.  We can view this as a form of “conservativeness” in behaviour, and in a more general macro-model this term won’t be necessary.</a:t>
+            </a:r>
+          </a:p>
+          <a:p>
+            <a:endParaRPr lang="en-AU" dirty="0"/>
+          </a:p>
+          <a:p>
+            <a:r>
+              <a:rPr lang="en-AU" dirty="0"/>
+              <a:t>When both instruments are set to zero, both inflation and output are below their target levels, which is why this is a “demand shock”.  We can imagine the game “started” with gamma and alpha at 2, and optimal policy at f = m = 0.</a:t>
+            </a:r>
           </a:p>
         </p:txBody>
       </p:sp>
@@ -3433,7 +3412,7 @@
     </p:spTree>
     <p:extLst>
       <p:ext uri="{BB962C8B-B14F-4D97-AF65-F5344CB8AC3E}">
-        <p14:creationId xmlns:p14="http://schemas.microsoft.com/office/powerpoint/2010/main" val="64880493"/>
+        <p14:creationId xmlns:p14="http://schemas.microsoft.com/office/powerpoint/2010/main" val="3856256237"/>
       </p:ext>
     </p:extLst>
   </p:cSld>
@@ -3487,6 +3466,60 @@
           <a:bodyPr/>
           <a:lstStyle/>
           <a:p>
+            <a:r>
+              <a:rPr lang="en-US" dirty="0"/>
+              <a:t>Demand shock:</a:t>
+            </a:r>
+          </a:p>
+          <a:p>
+            <a:endParaRPr lang="en-US" dirty="0"/>
+          </a:p>
+          <a:p>
+            <a:pPr marL="228600" indent="-228600">
+              <a:buAutoNum type="arabicParenR"/>
+            </a:pPr>
+            <a:r>
+              <a:rPr lang="en-US" dirty="0"/>
+              <a:t>NE leads to less easing by both authorities after a demand shock.</a:t>
+            </a:r>
+          </a:p>
+          <a:p>
+            <a:pPr marL="228600" indent="-228600">
+              <a:buAutoNum type="arabicParenR"/>
+            </a:pPr>
+            <a:endParaRPr lang="en-US" dirty="0"/>
+          </a:p>
+          <a:p>
+            <a:pPr marL="228600" indent="-228600">
+              <a:buAutoNum type="arabicParenR"/>
+            </a:pPr>
+            <a:r>
+              <a:rPr lang="en-US" dirty="0"/>
+              <a:t>“Pre-commitment” or “leadership” generates worse outcomes – unlike the other literature (i.e. </a:t>
+            </a:r>
+            <a:r>
+              <a:rPr lang="en-US" dirty="0" err="1"/>
+              <a:t>Debelle</a:t>
+            </a:r>
+            <a:r>
+              <a:rPr lang="en-US" dirty="0"/>
+              <a:t> and Fischer 1994).  Why? Cost of policy adjustment generates a free-rider problem which gets worse with pre-commitment.</a:t>
+            </a:r>
+          </a:p>
+          <a:p>
+            <a:pPr marL="228600" indent="-228600">
+              <a:buAutoNum type="arabicParenR"/>
+            </a:pPr>
+            <a:endParaRPr lang="en-US" dirty="0"/>
+          </a:p>
+          <a:p>
+            <a:pPr marL="228600" indent="-228600">
+              <a:buAutoNum type="arabicParenR"/>
+            </a:pPr>
+            <a:r>
+              <a:rPr lang="en-US" dirty="0"/>
+              <a:t>The idea here is that equilibrium play leads to “conservative” play by both fiscal and monetary authorities.</a:t>
+            </a:r>
             <a:endParaRPr lang="en-NZ" dirty="0"/>
           </a:p>
         </p:txBody>
@@ -3518,7 +3551,7 @@
     </p:spTree>
     <p:extLst>
       <p:ext uri="{BB962C8B-B14F-4D97-AF65-F5344CB8AC3E}">
-        <p14:creationId xmlns:p14="http://schemas.microsoft.com/office/powerpoint/2010/main" val="3866847914"/>
+        <p14:creationId xmlns:p14="http://schemas.microsoft.com/office/powerpoint/2010/main" val="64880493"/>
       </p:ext>
     </p:extLst>
   </p:cSld>
@@ -3572,11 +3605,7 @@
           <a:bodyPr/>
           <a:lstStyle/>
           <a:p>
-            <a:r>
-              <a:rPr lang="en-US" dirty="0"/>
-              <a:t>In this game “full offset” between monetary and fiscal authorities would lead to both instruments going in opposite directions to infinity, unless there is a constraint on their actions. This is the purpose of the “adjustment cost from target” in this loss function. In a macro-model equilibrium could be generated by relative economic responses to the instruments.</a:t>
-            </a:r>
-            <a:endParaRPr lang="en-AU" dirty="0"/>
+            <a:endParaRPr lang="en-NZ" dirty="0"/>
           </a:p>
         </p:txBody>
       </p:sp>
@@ -3607,7 +3636,7 @@
     </p:spTree>
     <p:extLst>
       <p:ext uri="{BB962C8B-B14F-4D97-AF65-F5344CB8AC3E}">
-        <p14:creationId xmlns:p14="http://schemas.microsoft.com/office/powerpoint/2010/main" val="511811182"/>
+        <p14:creationId xmlns:p14="http://schemas.microsoft.com/office/powerpoint/2010/main" val="3866847914"/>
       </p:ext>
     </p:extLst>
   </p:cSld>
@@ -3663,39 +3692,9 @@
           <a:p>
             <a:r>
               <a:rPr lang="en-US" dirty="0"/>
-              <a:t>Supply shock leads to:</a:t>
-            </a:r>
-          </a:p>
-          <a:p>
-            <a:endParaRPr lang="en-US" dirty="0"/>
-          </a:p>
-          <a:p>
-            <a:pPr marL="228600" indent="-228600">
-              <a:buAutoNum type="arabicParenR"/>
-            </a:pPr>
-            <a:r>
-              <a:rPr lang="en-US" dirty="0"/>
-              <a:t>Similar economic outcomes in NE and cooperative!</a:t>
-            </a:r>
-          </a:p>
-          <a:p>
-            <a:pPr marL="228600" indent="-228600">
-              <a:buAutoNum type="arabicParenR"/>
-            </a:pPr>
-            <a:r>
-              <a:rPr lang="en-US" dirty="0"/>
-              <a:t>However, drastic change in relative policy settings in NE – if policy variability has a cost to social welfare then this is costly.</a:t>
-            </a:r>
-          </a:p>
-          <a:p>
-            <a:pPr marL="228600" indent="-228600">
-              <a:buAutoNum type="arabicParenR"/>
-            </a:pPr>
-            <a:r>
-              <a:rPr lang="en-US" dirty="0"/>
-              <a:t>Pre-commitment/leadership generates a “second-mover advantage”. If the central bank pre-commits we end up with the lowest inflation outcomes, as the second mover determines which target we move closest to.</a:t>
-            </a:r>
-            <a:endParaRPr lang="en-NZ" dirty="0"/>
+              <a:t>In this game “full offset” between monetary and fiscal authorities would lead to both instruments going in opposite directions to infinity, unless there is a constraint on their actions. This is the purpose of the “adjustment cost from target” in this loss function. In a macro-model equilibrium could be generated by relative economic responses to the instruments.</a:t>
+            </a:r>
+            <a:endParaRPr lang="en-AU" dirty="0"/>
           </a:p>
         </p:txBody>
       </p:sp>
@@ -3726,7 +3725,7 @@
     </p:spTree>
     <p:extLst>
       <p:ext uri="{BB962C8B-B14F-4D97-AF65-F5344CB8AC3E}">
-        <p14:creationId xmlns:p14="http://schemas.microsoft.com/office/powerpoint/2010/main" val="3166340555"/>
+        <p14:creationId xmlns:p14="http://schemas.microsoft.com/office/powerpoint/2010/main" val="511811182"/>
       </p:ext>
     </p:extLst>
   </p:cSld>
@@ -3780,12 +3779,21 @@
           <a:bodyPr/>
           <a:lstStyle/>
           <a:p>
+            <a:r>
+              <a:rPr lang="en-US" dirty="0"/>
+              <a:t>Supply shock leads to:</a:t>
+            </a:r>
+          </a:p>
+          <a:p>
+            <a:endParaRPr lang="en-US" dirty="0"/>
+          </a:p>
+          <a:p>
             <a:pPr marL="228600" indent="-228600">
               <a:buAutoNum type="arabicParenR"/>
             </a:pPr>
             <a:r>
               <a:rPr lang="en-US" dirty="0"/>
-              <a:t>The pre-commitment game reduces the “loss” to authorities through the cost of adjustment.</a:t>
+              <a:t>Similar economic outcomes in NE and cooperative!</a:t>
             </a:r>
           </a:p>
           <a:p>
@@ -3794,7 +3802,16 @@
             </a:pPr>
             <a:r>
               <a:rPr lang="en-US" dirty="0"/>
-              <a:t>However, if social welfare does not care about adjustment costs, then the pre-commitment outcomes are the worst among all.</a:t>
+              <a:t>However, drastic change in relative policy settings in NE – if policy variability has a cost to social welfare then this is costly.</a:t>
+            </a:r>
+          </a:p>
+          <a:p>
+            <a:pPr marL="228600" indent="-228600">
+              <a:buAutoNum type="arabicParenR"/>
+            </a:pPr>
+            <a:r>
+              <a:rPr lang="en-US" dirty="0"/>
+              <a:t>Pre-commitment/leadership generates a “second-mover advantage”. If the central bank pre-commits we end up with the lowest inflation outcomes, as the second mover determines which target we move closest to.</a:t>
             </a:r>
             <a:endParaRPr lang="en-NZ" dirty="0"/>
           </a:p>
@@ -3827,7 +3844,7 @@
     </p:spTree>
     <p:extLst>
       <p:ext uri="{BB962C8B-B14F-4D97-AF65-F5344CB8AC3E}">
-        <p14:creationId xmlns:p14="http://schemas.microsoft.com/office/powerpoint/2010/main" val="2032148869"/>
+        <p14:creationId xmlns:p14="http://schemas.microsoft.com/office/powerpoint/2010/main" val="3166340555"/>
       </p:ext>
     </p:extLst>
   </p:cSld>
@@ -4011,9 +4028,21 @@
           <a:bodyPr/>
           <a:lstStyle/>
           <a:p>
+            <a:pPr marL="228600" indent="-228600">
+              <a:buAutoNum type="arabicParenR"/>
+            </a:pPr>
             <a:r>
               <a:rPr lang="en-US" dirty="0"/>
-              <a:t>1) Inflation only shock plays out similarly to the supply shock.</a:t>
+              <a:t>The pre-commitment game reduces the “loss” to authorities through the cost of adjustment.</a:t>
+            </a:r>
+          </a:p>
+          <a:p>
+            <a:pPr marL="228600" indent="-228600">
+              <a:buAutoNum type="arabicParenR"/>
+            </a:pPr>
+            <a:r>
+              <a:rPr lang="en-US" dirty="0"/>
+              <a:t>However, if social welfare does not care about adjustment costs, then the pre-commitment outcomes are the worst among all.</a:t>
             </a:r>
             <a:endParaRPr lang="en-NZ" dirty="0"/>
           </a:p>
@@ -4037,7 +4066,7 @@
             <a:fld id="{22FC436C-5653-4517-9B94-0BB68ACE2454}" type="slidenum">
               <a:rPr lang="en-AU" smtClean="0"/>
               <a:pPr/>
-              <a:t>21</a:t>
+              <a:t>20</a:t>
             </a:fld>
             <a:endParaRPr lang="en-AU"/>
           </a:p>
@@ -4046,7 +4075,7 @@
     </p:spTree>
     <p:extLst>
       <p:ext uri="{BB962C8B-B14F-4D97-AF65-F5344CB8AC3E}">
-        <p14:creationId xmlns:p14="http://schemas.microsoft.com/office/powerpoint/2010/main" val="487602013"/>
+        <p14:creationId xmlns:p14="http://schemas.microsoft.com/office/powerpoint/2010/main" val="2032148869"/>
       </p:ext>
     </p:extLst>
   </p:cSld>
@@ -4100,6 +4129,10 @@
           <a:bodyPr/>
           <a:lstStyle/>
           <a:p>
+            <a:r>
+              <a:rPr lang="en-US" dirty="0"/>
+              <a:t>1) Inflation only shock plays out similarly to the supply shock.</a:t>
+            </a:r>
             <a:endParaRPr lang="en-NZ" dirty="0"/>
           </a:p>
         </p:txBody>
@@ -4131,7 +4164,7 @@
     </p:spTree>
     <p:extLst>
       <p:ext uri="{BB962C8B-B14F-4D97-AF65-F5344CB8AC3E}">
-        <p14:creationId xmlns:p14="http://schemas.microsoft.com/office/powerpoint/2010/main" val="1270918843"/>
+        <p14:creationId xmlns:p14="http://schemas.microsoft.com/office/powerpoint/2010/main" val="487602013"/>
       </p:ext>
     </p:extLst>
   </p:cSld>
@@ -4185,46 +4218,7 @@
           <a:bodyPr/>
           <a:lstStyle/>
           <a:p>
-            <a:r>
-              <a:rPr lang="en-AU" dirty="0"/>
-              <a:t>What is the logic – a Stackelberg model does not mean that one player moves first.  It means that the other player KNOWS what that players choice will be.  There is an infinite cost for the player from changing from the choice the other player anticipates.  </a:t>
-            </a:r>
-            <a:br>
-              <a:rPr lang="en-AU" dirty="0"/>
-            </a:br>
-            <a:br>
-              <a:rPr lang="en-AU" dirty="0"/>
-            </a:br>
-            <a:r>
-              <a:rPr lang="en-AU" dirty="0"/>
-              <a:t>We can generate similar dynamics by reducing the size of the cost for changing behaviour. If there is an “adjustment cost” then a decision maker will be unwilling to adjust their behaviour if the benefit of moving to the true “optimum” is less than the cost of moving (i.e. menu cost models of the costs of inflation).  As a result, by setting such a cost an individual is able to credibly commit to a different course of action than the static </a:t>
-            </a:r>
-            <a:r>
-              <a:rPr lang="en-AU" dirty="0" err="1"/>
-              <a:t>nash</a:t>
-            </a:r>
-            <a:r>
-              <a:rPr lang="en-AU" dirty="0"/>
-              <a:t> equilibrium.</a:t>
-            </a:r>
-          </a:p>
-          <a:p>
-            <a:endParaRPr lang="en-AU" dirty="0"/>
-          </a:p>
-          <a:p>
-            <a:r>
-              <a:rPr lang="en-AU" dirty="0"/>
-              <a:t>Two-choice game shows how this works. Dynamic game allows us to describe the process, and to consider the endogenous choice of adjustment costs.</a:t>
-            </a:r>
-          </a:p>
-          <a:p>
-            <a:endParaRPr lang="en-AU" dirty="0"/>
-          </a:p>
-          <a:p>
-            <a:r>
-              <a:rPr lang="en-AU" dirty="0"/>
-              <a:t>Then incorporating it into a macro-model will allow us to more richly describe outcomes, why this matters, and how government and monetary authorities respond to shocks.</a:t>
-            </a:r>
+            <a:endParaRPr lang="en-NZ" dirty="0"/>
           </a:p>
         </p:txBody>
       </p:sp>
@@ -4235,7 +4229,7 @@
             <a:spLocks noGrp="1"/>
           </p:cNvSpPr>
           <p:nvPr>
-            <p:ph type="sldNum" sz="quarter" idx="10"/>
+            <p:ph type="sldNum" sz="quarter" idx="5"/>
           </p:nvPr>
         </p:nvSpPr>
         <p:spPr/>
@@ -4255,7 +4249,7 @@
     </p:spTree>
     <p:extLst>
       <p:ext uri="{BB962C8B-B14F-4D97-AF65-F5344CB8AC3E}">
-        <p14:creationId xmlns:p14="http://schemas.microsoft.com/office/powerpoint/2010/main" val="1335021091"/>
+        <p14:creationId xmlns:p14="http://schemas.microsoft.com/office/powerpoint/2010/main" val="1270918843"/>
       </p:ext>
     </p:extLst>
   </p:cSld>
@@ -4310,28 +4304,45 @@
           <a:lstStyle/>
           <a:p>
             <a:r>
-              <a:rPr lang="en-US" dirty="0"/>
-              <a:t>To illustrate we start with a simple model where the choice is made twice.</a:t>
-            </a:r>
-          </a:p>
-          <a:p>
-            <a:endParaRPr lang="en-US" dirty="0"/>
-          </a:p>
-          <a:p>
-            <a:r>
-              <a:rPr lang="en-US" dirty="0"/>
-              <a:t>Describe in words that we have a model that is the same as above, however there is now an adjustment cost for changing your policy settings between stage 1 and 2.  In both stages “demand” is low by the same amount, so the optimal policy should be symmetric. However, the strategic incentive does influence choices.</a:t>
-            </a:r>
-          </a:p>
-          <a:p>
-            <a:endParaRPr lang="en-US" dirty="0"/>
-          </a:p>
-          <a:p>
-            <a:r>
-              <a:rPr lang="en-US" dirty="0"/>
-              <a:t>While we coded the static game in R, have switched to Julia to solve this model, and will use Julia for the infinite horizon version.</a:t>
-            </a:r>
-            <a:endParaRPr lang="en-NZ" dirty="0"/>
+              <a:rPr lang="en-AU" dirty="0"/>
+              <a:t>What is the logic – a Stackelberg model does not mean that one player moves first.  It means that the other player KNOWS what that players choice will be.  There is an infinite cost for the player from changing from the choice the other player anticipates.  </a:t>
+            </a:r>
+            <a:br>
+              <a:rPr lang="en-AU" dirty="0"/>
+            </a:br>
+            <a:br>
+              <a:rPr lang="en-AU" dirty="0"/>
+            </a:br>
+            <a:r>
+              <a:rPr lang="en-AU" dirty="0"/>
+              <a:t>We can generate similar dynamics by reducing the size of the cost for changing behaviour. If there is an “adjustment cost” then a decision maker will be unwilling to adjust their behaviour if the benefit of moving to the true “optimum” is less than the cost of moving (i.e. menu cost models of the costs of inflation).  As a result, by setting such a cost an individual is able to credibly commit to a different course of action than the static </a:t>
+            </a:r>
+            <a:r>
+              <a:rPr lang="en-AU" dirty="0" err="1"/>
+              <a:t>nash</a:t>
+            </a:r>
+            <a:r>
+              <a:rPr lang="en-AU" dirty="0"/>
+              <a:t> equilibrium.</a:t>
+            </a:r>
+          </a:p>
+          <a:p>
+            <a:endParaRPr lang="en-AU" dirty="0"/>
+          </a:p>
+          <a:p>
+            <a:r>
+              <a:rPr lang="en-AU" dirty="0"/>
+              <a:t>Two-choice game shows how this works. Dynamic game allows us to describe the process, and to consider the endogenous choice of adjustment costs.</a:t>
+            </a:r>
+          </a:p>
+          <a:p>
+            <a:endParaRPr lang="en-AU" dirty="0"/>
+          </a:p>
+          <a:p>
+            <a:r>
+              <a:rPr lang="en-AU" dirty="0"/>
+              <a:t>Then incorporating it into a macro-model will allow us to more richly describe outcomes, why this matters, and how government and monetary authorities respond to shocks.</a:t>
+            </a:r>
           </a:p>
         </p:txBody>
       </p:sp>
@@ -4342,7 +4353,7 @@
             <a:spLocks noGrp="1"/>
           </p:cNvSpPr>
           <p:nvPr>
-            <p:ph type="sldNum" sz="quarter" idx="5"/>
+            <p:ph type="sldNum" sz="quarter" idx="10"/>
           </p:nvPr>
         </p:nvSpPr>
         <p:spPr/>
@@ -4362,7 +4373,7 @@
     </p:spTree>
     <p:extLst>
       <p:ext uri="{BB962C8B-B14F-4D97-AF65-F5344CB8AC3E}">
-        <p14:creationId xmlns:p14="http://schemas.microsoft.com/office/powerpoint/2010/main" val="1377406453"/>
+        <p14:creationId xmlns:p14="http://schemas.microsoft.com/office/powerpoint/2010/main" val="1335021091"/>
       </p:ext>
     </p:extLst>
   </p:cSld>
@@ -4418,6 +4429,15 @@
           <a:p>
             <a:r>
               <a:rPr lang="en-US" dirty="0"/>
+              <a:t>To illustrate we start with a simple model where the choice is made twice.</a:t>
+            </a:r>
+          </a:p>
+          <a:p>
+            <a:endParaRPr lang="en-US" dirty="0"/>
+          </a:p>
+          <a:p>
+            <a:r>
+              <a:rPr lang="en-US" dirty="0"/>
               <a:t>Describe in words that we have a model that is the same as above, however there is now an adjustment cost for changing your policy settings between stage 1 and 2.  In both stages “demand” is low by the same amount, so the optimal policy should be symmetric. However, the strategic incentive does influence choices.</a:t>
             </a:r>
           </a:p>
@@ -4427,7 +4447,7 @@
           <a:p>
             <a:r>
               <a:rPr lang="en-US" dirty="0"/>
-              <a:t>Why we coded the static game in R, have switched to Julia to solve this model, and will use Julia for the infinite horizon version.</a:t>
+              <a:t>While we coded the static game in R, have switched to Julia to solve this model, and will use Julia for the infinite horizon version.</a:t>
             </a:r>
             <a:endParaRPr lang="en-NZ" dirty="0"/>
           </a:p>
@@ -4460,7 +4480,7 @@
     </p:spTree>
     <p:extLst>
       <p:ext uri="{BB962C8B-B14F-4D97-AF65-F5344CB8AC3E}">
-        <p14:creationId xmlns:p14="http://schemas.microsoft.com/office/powerpoint/2010/main" val="368655684"/>
+        <p14:creationId xmlns:p14="http://schemas.microsoft.com/office/powerpoint/2010/main" val="1377406453"/>
       </p:ext>
     </p:extLst>
   </p:cSld>
@@ -4516,7 +4536,7 @@
           <a:p>
             <a:r>
               <a:rPr lang="en-US" dirty="0"/>
-              <a:t>This is not the dynamic game, it is the transition dynamics from the initial equilibrium where inflation and output are at target and both policies are zero, to the Nash Equilibrium when gamma has fallen to 1.5.  In other words, this is the same Nash Equilibrium as before, but it is costly for agents to adjust their policy from the prior level and so it takes time to adjust.</a:t>
+              <a:t>Describe in words that we have a model that is the same as above, however there is now an adjustment cost for changing your policy settings between stage 1 and 2.  In both stages “demand” is low by the same amount, so the optimal policy should be symmetric. However, the strategic incentive does influence choices.</a:t>
             </a:r>
           </a:p>
           <a:p>
@@ -4525,24 +4545,16 @@
           <a:p>
             <a:r>
               <a:rPr lang="en-US" dirty="0"/>
-              <a:t>The purpose of this is to show how adjustment costs influence the choice of the agents – and even in games without intertemporal strategic </a:t>
-            </a:r>
-            <a:r>
-              <a:rPr lang="en-US" dirty="0" err="1"/>
-              <a:t>behaviour</a:t>
-            </a:r>
+              <a:t>Why we coded the static game in R, have switched to Julia to solve this model, and will use Julia for the infinite horizon version.</a:t>
+            </a:r>
+          </a:p>
+          <a:p>
+            <a:endParaRPr lang="en-US" dirty="0"/>
+          </a:p>
+          <a:p>
             <a:r>
               <a:rPr lang="en-US" dirty="0"/>
-              <a:t>, we see interesting responses to shocks.</a:t>
-            </a:r>
-          </a:p>
-          <a:p>
-            <a:endParaRPr lang="en-US" dirty="0"/>
-          </a:p>
-          <a:p>
-            <a:r>
-              <a:rPr lang="en-US" dirty="0"/>
-              <a:t>This does not consider how an agent sets their policy in order to influence the future policy of the other agent. As a result, there is no intertemporal strategic element (i.e. this isn’t the dynamic game yet). However, the addition of adjustment costs already provides interesting dynamics in the transition to the steady state (which is the NE).  This is what we are solving with the dynamic game at present.</a:t>
+              <a:t>Note: Comparison here was to an earlier version of the static game – not using this anymore as we have the full dynamic game solved.</a:t>
             </a:r>
             <a:endParaRPr lang="en-NZ" dirty="0"/>
           </a:p>
@@ -4567,6 +4579,121 @@
               <a:rPr lang="en-AU" smtClean="0"/>
               <a:pPr/>
               <a:t>26</a:t>
+            </a:fld>
+            <a:endParaRPr lang="en-AU"/>
+          </a:p>
+        </p:txBody>
+      </p:sp>
+    </p:spTree>
+    <p:extLst>
+      <p:ext uri="{BB962C8B-B14F-4D97-AF65-F5344CB8AC3E}">
+        <p14:creationId xmlns:p14="http://schemas.microsoft.com/office/powerpoint/2010/main" val="368655684"/>
+      </p:ext>
+    </p:extLst>
+  </p:cSld>
+  <p:clrMapOvr>
+    <a:masterClrMapping/>
+  </p:clrMapOvr>
+</p:notes>
+</file>
+
+<file path=ppt/notesSlides/notesSlide26.xml><?xml version="1.0" encoding="utf-8"?>
+<p:notes xmlns:a="http://schemas.openxmlformats.org/drawingml/2006/main" xmlns:r="http://schemas.openxmlformats.org/officeDocument/2006/relationships" xmlns:p="http://schemas.openxmlformats.org/presentationml/2006/main">
+  <p:cSld>
+    <p:spTree>
+      <p:nvGrpSpPr>
+        <p:cNvPr id="1" name=""/>
+        <p:cNvGrpSpPr/>
+        <p:nvPr/>
+      </p:nvGrpSpPr>
+      <p:grpSpPr>
+        <a:xfrm>
+          <a:off x="0" y="0"/>
+          <a:ext cx="0" cy="0"/>
+          <a:chOff x="0" y="0"/>
+          <a:chExt cx="0" cy="0"/>
+        </a:xfrm>
+      </p:grpSpPr>
+      <p:sp>
+        <p:nvSpPr>
+          <p:cNvPr id="2" name="Slide Image Placeholder 1"/>
+          <p:cNvSpPr>
+            <a:spLocks noGrp="1" noRot="1" noChangeAspect="1"/>
+          </p:cNvSpPr>
+          <p:nvPr>
+            <p:ph type="sldImg"/>
+          </p:nvPr>
+        </p:nvSpPr>
+        <p:spPr/>
+      </p:sp>
+      <p:sp>
+        <p:nvSpPr>
+          <p:cNvPr id="3" name="Notes Placeholder 2"/>
+          <p:cNvSpPr>
+            <a:spLocks noGrp="1"/>
+          </p:cNvSpPr>
+          <p:nvPr>
+            <p:ph type="body" idx="1"/>
+          </p:nvPr>
+        </p:nvSpPr>
+        <p:spPr/>
+        <p:txBody>
+          <a:bodyPr/>
+          <a:lstStyle/>
+          <a:p>
+            <a:r>
+              <a:rPr lang="en-US" dirty="0"/>
+              <a:t>This is not the dynamic game, it is the transition dynamics from the initial equilibrium where inflation and output are at target and both policies are zero, to the Nash Equilibrium when gamma has fallen to 1.5.  In other words, this is the same Nash Equilibrium as before, but it is costly for agents to adjust their policy from the prior level and so it takes time to adjust.</a:t>
+            </a:r>
+          </a:p>
+          <a:p>
+            <a:endParaRPr lang="en-US" dirty="0"/>
+          </a:p>
+          <a:p>
+            <a:r>
+              <a:rPr lang="en-US" dirty="0"/>
+              <a:t>The purpose of this is to show how adjustment costs influence the choice of the agents – and even in games without intertemporal strategic </a:t>
+            </a:r>
+            <a:r>
+              <a:rPr lang="en-US" dirty="0" err="1"/>
+              <a:t>behaviour</a:t>
+            </a:r>
+            <a:r>
+              <a:rPr lang="en-US" dirty="0"/>
+              <a:t>, we see interesting responses to shocks.</a:t>
+            </a:r>
+          </a:p>
+          <a:p>
+            <a:endParaRPr lang="en-US" dirty="0"/>
+          </a:p>
+          <a:p>
+            <a:r>
+              <a:rPr lang="en-US" dirty="0"/>
+              <a:t>This does not consider how an agent sets their policy in order to influence the future policy of the other agent. As a result, there is no intertemporal strategic element (i.e. this isn’t the dynamic game yet). However, the addition of adjustment costs already provides interesting dynamics in the transition to the steady state (which is the NE).  This is what we are solving with the dynamic game at present.</a:t>
+            </a:r>
+            <a:endParaRPr lang="en-NZ" dirty="0"/>
+          </a:p>
+        </p:txBody>
+      </p:sp>
+      <p:sp>
+        <p:nvSpPr>
+          <p:cNvPr id="4" name="Slide Number Placeholder 3"/>
+          <p:cNvSpPr>
+            <a:spLocks noGrp="1"/>
+          </p:cNvSpPr>
+          <p:nvPr>
+            <p:ph type="sldNum" sz="quarter" idx="5"/>
+          </p:nvPr>
+        </p:nvSpPr>
+        <p:spPr/>
+        <p:txBody>
+          <a:bodyPr/>
+          <a:lstStyle/>
+          <a:p>
+            <a:fld id="{22FC436C-5653-4517-9B94-0BB68ACE2454}" type="slidenum">
+              <a:rPr lang="en-AU" smtClean="0"/>
+              <a:pPr/>
+              <a:t>27</a:t>
             </a:fld>
             <a:endParaRPr lang="en-AU"/>
           </a:p>
@@ -4585,7 +4712,7 @@
 </p:notes>
 </file>
 
-<file path=ppt/notesSlides/notesSlide26.xml><?xml version="1.0" encoding="utf-8"?>
+<file path=ppt/notesSlides/notesSlide27.xml><?xml version="1.0" encoding="utf-8"?>
 <p:notes xmlns:a="http://schemas.openxmlformats.org/drawingml/2006/main" xmlns:r="http://schemas.openxmlformats.org/officeDocument/2006/relationships" xmlns:p="http://schemas.openxmlformats.org/presentationml/2006/main">
   <p:cSld>
     <p:spTree>
@@ -4675,7 +4802,7 @@
             <a:fld id="{22FC436C-5653-4517-9B94-0BB68ACE2454}" type="slidenum">
               <a:rPr lang="en-AU" smtClean="0"/>
               <a:pPr/>
-              <a:t>27</a:t>
+              <a:t>28</a:t>
             </a:fld>
             <a:endParaRPr lang="en-AU"/>
           </a:p>
@@ -4694,7 +4821,7 @@
 </p:notes>
 </file>
 
-<file path=ppt/notesSlides/notesSlide27.xml><?xml version="1.0" encoding="utf-8"?>
+<file path=ppt/notesSlides/notesSlide28.xml><?xml version="1.0" encoding="utf-8"?>
 <p:notes xmlns:a="http://schemas.openxmlformats.org/drawingml/2006/main" xmlns:r="http://schemas.openxmlformats.org/officeDocument/2006/relationships" xmlns:p="http://schemas.openxmlformats.org/presentationml/2006/main">
   <p:cSld>
     <p:spTree>
@@ -4815,7 +4942,7 @@
             <a:fld id="{22FC436C-5653-4517-9B94-0BB68ACE2454}" type="slidenum">
               <a:rPr lang="en-AU" smtClean="0"/>
               <a:pPr/>
-              <a:t>28</a:t>
+              <a:t>29</a:t>
             </a:fld>
             <a:endParaRPr lang="en-AU"/>
           </a:p>
@@ -4834,7 +4961,7 @@
 </p:notes>
 </file>
 
-<file path=ppt/notesSlides/notesSlide28.xml><?xml version="1.0" encoding="utf-8"?>
+<file path=ppt/notesSlides/notesSlide29.xml><?xml version="1.0" encoding="utf-8"?>
 <p:notes xmlns:a="http://schemas.openxmlformats.org/drawingml/2006/main" xmlns:r="http://schemas.openxmlformats.org/officeDocument/2006/relationships" xmlns:p="http://schemas.openxmlformats.org/presentationml/2006/main">
   <p:cSld>
     <p:spTree>
@@ -4928,7 +5055,7 @@
             <a:fld id="{22FC436C-5653-4517-9B94-0BB68ACE2454}" type="slidenum">
               <a:rPr lang="en-AU" smtClean="0"/>
               <a:pPr/>
-              <a:t>29</a:t>
+              <a:t>30</a:t>
             </a:fld>
             <a:endParaRPr lang="en-AU"/>
           </a:p>
@@ -4938,119 +5065,6 @@
     <p:extLst>
       <p:ext uri="{BB962C8B-B14F-4D97-AF65-F5344CB8AC3E}">
         <p14:creationId xmlns:p14="http://schemas.microsoft.com/office/powerpoint/2010/main" val="4179515843"/>
-      </p:ext>
-    </p:extLst>
-  </p:cSld>
-  <p:clrMapOvr>
-    <a:masterClrMapping/>
-  </p:clrMapOvr>
-</p:notes>
-</file>
-
-<file path=ppt/notesSlides/notesSlide29.xml><?xml version="1.0" encoding="utf-8"?>
-<p:notes xmlns:a="http://schemas.openxmlformats.org/drawingml/2006/main" xmlns:r="http://schemas.openxmlformats.org/officeDocument/2006/relationships" xmlns:p="http://schemas.openxmlformats.org/presentationml/2006/main">
-  <p:cSld>
-    <p:spTree>
-      <p:nvGrpSpPr>
-        <p:cNvPr id="1" name="">
-          <a:extLst>
-            <a:ext uri="{FF2B5EF4-FFF2-40B4-BE49-F238E27FC236}">
-              <a16:creationId xmlns:a16="http://schemas.microsoft.com/office/drawing/2014/main" id="{AC8B5306-AA10-69EB-948A-F66D553645A3}"/>
-            </a:ext>
-          </a:extLst>
-        </p:cNvPr>
-        <p:cNvGrpSpPr/>
-        <p:nvPr/>
-      </p:nvGrpSpPr>
-      <p:grpSpPr>
-        <a:xfrm>
-          <a:off x="0" y="0"/>
-          <a:ext cx="0" cy="0"/>
-          <a:chOff x="0" y="0"/>
-          <a:chExt cx="0" cy="0"/>
-        </a:xfrm>
-      </p:grpSpPr>
-      <p:sp>
-        <p:nvSpPr>
-          <p:cNvPr id="2" name="Slide Image Placeholder 1">
-            <a:extLst>
-              <a:ext uri="{FF2B5EF4-FFF2-40B4-BE49-F238E27FC236}">
-                <a16:creationId xmlns:a16="http://schemas.microsoft.com/office/drawing/2014/main" id="{50973E23-7942-F7FE-A5B8-19906469C0C6}"/>
-              </a:ext>
-            </a:extLst>
-          </p:cNvPr>
-          <p:cNvSpPr>
-            <a:spLocks noGrp="1" noRot="1" noChangeAspect="1"/>
-          </p:cNvSpPr>
-          <p:nvPr>
-            <p:ph type="sldImg"/>
-          </p:nvPr>
-        </p:nvSpPr>
-        <p:spPr/>
-      </p:sp>
-      <p:sp>
-        <p:nvSpPr>
-          <p:cNvPr id="3" name="Notes Placeholder 2">
-            <a:extLst>
-              <a:ext uri="{FF2B5EF4-FFF2-40B4-BE49-F238E27FC236}">
-                <a16:creationId xmlns:a16="http://schemas.microsoft.com/office/drawing/2014/main" id="{E09063E8-6505-268B-A18F-CF76325B97A1}"/>
-              </a:ext>
-            </a:extLst>
-          </p:cNvPr>
-          <p:cNvSpPr>
-            <a:spLocks noGrp="1"/>
-          </p:cNvSpPr>
-          <p:nvPr>
-            <p:ph type="body" idx="1"/>
-          </p:nvPr>
-        </p:nvSpPr>
-        <p:spPr/>
-        <p:txBody>
-          <a:bodyPr/>
-          <a:lstStyle/>
-          <a:p>
-            <a:r>
-              <a:rPr lang="en-US" dirty="0"/>
-              <a:t>XXX</a:t>
-            </a:r>
-            <a:endParaRPr lang="en-NZ" dirty="0"/>
-          </a:p>
-        </p:txBody>
-      </p:sp>
-      <p:sp>
-        <p:nvSpPr>
-          <p:cNvPr id="4" name="Slide Number Placeholder 3">
-            <a:extLst>
-              <a:ext uri="{FF2B5EF4-FFF2-40B4-BE49-F238E27FC236}">
-                <a16:creationId xmlns:a16="http://schemas.microsoft.com/office/drawing/2014/main" id="{22BB2D68-4417-E2FF-6872-B04B454C59C1}"/>
-              </a:ext>
-            </a:extLst>
-          </p:cNvPr>
-          <p:cNvSpPr>
-            <a:spLocks noGrp="1"/>
-          </p:cNvSpPr>
-          <p:nvPr>
-            <p:ph type="sldNum" sz="quarter" idx="5"/>
-          </p:nvPr>
-        </p:nvSpPr>
-        <p:spPr/>
-        <p:txBody>
-          <a:bodyPr/>
-          <a:lstStyle/>
-          <a:p>
-            <a:fld id="{22FC436C-5653-4517-9B94-0BB68ACE2454}" type="slidenum">
-              <a:rPr lang="en-AU" smtClean="0"/>
-              <a:pPr/>
-              <a:t>30</a:t>
-            </a:fld>
-            <a:endParaRPr lang="en-AU"/>
-          </a:p>
-        </p:txBody>
-      </p:sp>
-    </p:spTree>
-    <p:extLst>
-      <p:ext uri="{BB962C8B-B14F-4D97-AF65-F5344CB8AC3E}">
-        <p14:creationId xmlns:p14="http://schemas.microsoft.com/office/powerpoint/2010/main" val="1508711771"/>
       </p:ext>
     </p:extLst>
   </p:cSld>
@@ -5101,7 +5115,9 @@
         </p:nvSpPr>
         <p:spPr/>
         <p:txBody>
-          <a:bodyPr/>
+          <a:bodyPr>
+            <a:normAutofit fontScale="92500" lnSpcReduction="20000"/>
+          </a:bodyPr>
           <a:lstStyle/>
           <a:p>
             <a:r>
@@ -5211,6 +5227,345 @@
   <p:cSld>
     <p:spTree>
       <p:nvGrpSpPr>
+        <p:cNvPr id="1" name="">
+          <a:extLst>
+            <a:ext uri="{FF2B5EF4-FFF2-40B4-BE49-F238E27FC236}">
+              <a16:creationId xmlns:a16="http://schemas.microsoft.com/office/drawing/2014/main" id="{AC8B5306-AA10-69EB-948A-F66D553645A3}"/>
+            </a:ext>
+          </a:extLst>
+        </p:cNvPr>
+        <p:cNvGrpSpPr/>
+        <p:nvPr/>
+      </p:nvGrpSpPr>
+      <p:grpSpPr>
+        <a:xfrm>
+          <a:off x="0" y="0"/>
+          <a:ext cx="0" cy="0"/>
+          <a:chOff x="0" y="0"/>
+          <a:chExt cx="0" cy="0"/>
+        </a:xfrm>
+      </p:grpSpPr>
+      <p:sp>
+        <p:nvSpPr>
+          <p:cNvPr id="2" name="Slide Image Placeholder 1">
+            <a:extLst>
+              <a:ext uri="{FF2B5EF4-FFF2-40B4-BE49-F238E27FC236}">
+                <a16:creationId xmlns:a16="http://schemas.microsoft.com/office/drawing/2014/main" id="{50973E23-7942-F7FE-A5B8-19906469C0C6}"/>
+              </a:ext>
+            </a:extLst>
+          </p:cNvPr>
+          <p:cNvSpPr>
+            <a:spLocks noGrp="1" noRot="1" noChangeAspect="1"/>
+          </p:cNvSpPr>
+          <p:nvPr>
+            <p:ph type="sldImg"/>
+          </p:nvPr>
+        </p:nvSpPr>
+        <p:spPr/>
+      </p:sp>
+      <p:sp>
+        <p:nvSpPr>
+          <p:cNvPr id="3" name="Notes Placeholder 2">
+            <a:extLst>
+              <a:ext uri="{FF2B5EF4-FFF2-40B4-BE49-F238E27FC236}">
+                <a16:creationId xmlns:a16="http://schemas.microsoft.com/office/drawing/2014/main" id="{E09063E8-6505-268B-A18F-CF76325B97A1}"/>
+              </a:ext>
+            </a:extLst>
+          </p:cNvPr>
+          <p:cNvSpPr>
+            <a:spLocks noGrp="1"/>
+          </p:cNvSpPr>
+          <p:nvPr>
+            <p:ph type="body" idx="1"/>
+          </p:nvPr>
+        </p:nvSpPr>
+        <p:spPr/>
+        <p:txBody>
+          <a:bodyPr/>
+          <a:lstStyle/>
+          <a:p>
+            <a:r>
+              <a:rPr lang="en-US" dirty="0"/>
+              <a:t>XXX</a:t>
+            </a:r>
+            <a:endParaRPr lang="en-NZ" dirty="0"/>
+          </a:p>
+        </p:txBody>
+      </p:sp>
+      <p:sp>
+        <p:nvSpPr>
+          <p:cNvPr id="4" name="Slide Number Placeholder 3">
+            <a:extLst>
+              <a:ext uri="{FF2B5EF4-FFF2-40B4-BE49-F238E27FC236}">
+                <a16:creationId xmlns:a16="http://schemas.microsoft.com/office/drawing/2014/main" id="{22BB2D68-4417-E2FF-6872-B04B454C59C1}"/>
+              </a:ext>
+            </a:extLst>
+          </p:cNvPr>
+          <p:cNvSpPr>
+            <a:spLocks noGrp="1"/>
+          </p:cNvSpPr>
+          <p:nvPr>
+            <p:ph type="sldNum" sz="quarter" idx="5"/>
+          </p:nvPr>
+        </p:nvSpPr>
+        <p:spPr/>
+        <p:txBody>
+          <a:bodyPr/>
+          <a:lstStyle/>
+          <a:p>
+            <a:fld id="{22FC436C-5653-4517-9B94-0BB68ACE2454}" type="slidenum">
+              <a:rPr lang="en-AU" smtClean="0"/>
+              <a:pPr/>
+              <a:t>31</a:t>
+            </a:fld>
+            <a:endParaRPr lang="en-AU"/>
+          </a:p>
+        </p:txBody>
+      </p:sp>
+    </p:spTree>
+    <p:extLst>
+      <p:ext uri="{BB962C8B-B14F-4D97-AF65-F5344CB8AC3E}">
+        <p14:creationId xmlns:p14="http://schemas.microsoft.com/office/powerpoint/2010/main" val="1508711771"/>
+      </p:ext>
+    </p:extLst>
+  </p:cSld>
+  <p:clrMapOvr>
+    <a:masterClrMapping/>
+  </p:clrMapOvr>
+</p:notes>
+</file>
+
+<file path=ppt/notesSlides/notesSlide31.xml><?xml version="1.0" encoding="utf-8"?>
+<p:notes xmlns:a="http://schemas.openxmlformats.org/drawingml/2006/main" xmlns:r="http://schemas.openxmlformats.org/officeDocument/2006/relationships" xmlns:p="http://schemas.openxmlformats.org/presentationml/2006/main">
+  <p:cSld>
+    <p:spTree>
+      <p:nvGrpSpPr>
+        <p:cNvPr id="1" name="">
+          <a:extLst>
+            <a:ext uri="{FF2B5EF4-FFF2-40B4-BE49-F238E27FC236}">
+              <a16:creationId xmlns:a16="http://schemas.microsoft.com/office/drawing/2014/main" id="{A95AAA61-7883-75FA-7C0A-308EA5C81CAA}"/>
+            </a:ext>
+          </a:extLst>
+        </p:cNvPr>
+        <p:cNvGrpSpPr/>
+        <p:nvPr/>
+      </p:nvGrpSpPr>
+      <p:grpSpPr>
+        <a:xfrm>
+          <a:off x="0" y="0"/>
+          <a:ext cx="0" cy="0"/>
+          <a:chOff x="0" y="0"/>
+          <a:chExt cx="0" cy="0"/>
+        </a:xfrm>
+      </p:grpSpPr>
+      <p:sp>
+        <p:nvSpPr>
+          <p:cNvPr id="2" name="Slide Image Placeholder 1">
+            <a:extLst>
+              <a:ext uri="{FF2B5EF4-FFF2-40B4-BE49-F238E27FC236}">
+                <a16:creationId xmlns:a16="http://schemas.microsoft.com/office/drawing/2014/main" id="{28AEB369-DF0C-8BF4-96FD-7AAEDEE6E184}"/>
+              </a:ext>
+            </a:extLst>
+          </p:cNvPr>
+          <p:cNvSpPr>
+            <a:spLocks noGrp="1" noRot="1" noChangeAspect="1"/>
+          </p:cNvSpPr>
+          <p:nvPr>
+            <p:ph type="sldImg"/>
+          </p:nvPr>
+        </p:nvSpPr>
+        <p:spPr/>
+      </p:sp>
+      <p:sp>
+        <p:nvSpPr>
+          <p:cNvPr id="3" name="Notes Placeholder 2">
+            <a:extLst>
+              <a:ext uri="{FF2B5EF4-FFF2-40B4-BE49-F238E27FC236}">
+                <a16:creationId xmlns:a16="http://schemas.microsoft.com/office/drawing/2014/main" id="{80224F67-215C-38D5-BD9F-7CEE8AF3EEBB}"/>
+              </a:ext>
+            </a:extLst>
+          </p:cNvPr>
+          <p:cNvSpPr>
+            <a:spLocks noGrp="1"/>
+          </p:cNvSpPr>
+          <p:nvPr>
+            <p:ph type="body" idx="1"/>
+          </p:nvPr>
+        </p:nvSpPr>
+        <p:spPr/>
+        <p:txBody>
+          <a:bodyPr/>
+          <a:lstStyle/>
+          <a:p>
+            <a:r>
+              <a:rPr lang="en-US" dirty="0"/>
+              <a:t>XXX</a:t>
+            </a:r>
+            <a:endParaRPr lang="en-NZ" dirty="0"/>
+          </a:p>
+        </p:txBody>
+      </p:sp>
+      <p:sp>
+        <p:nvSpPr>
+          <p:cNvPr id="4" name="Slide Number Placeholder 3">
+            <a:extLst>
+              <a:ext uri="{FF2B5EF4-FFF2-40B4-BE49-F238E27FC236}">
+                <a16:creationId xmlns:a16="http://schemas.microsoft.com/office/drawing/2014/main" id="{3E6FA805-AAA2-1A4C-B364-8CDD5FC4C0BF}"/>
+              </a:ext>
+            </a:extLst>
+          </p:cNvPr>
+          <p:cNvSpPr>
+            <a:spLocks noGrp="1"/>
+          </p:cNvSpPr>
+          <p:nvPr>
+            <p:ph type="sldNum" sz="quarter" idx="5"/>
+          </p:nvPr>
+        </p:nvSpPr>
+        <p:spPr/>
+        <p:txBody>
+          <a:bodyPr/>
+          <a:lstStyle/>
+          <a:p>
+            <a:fld id="{22FC436C-5653-4517-9B94-0BB68ACE2454}" type="slidenum">
+              <a:rPr lang="en-AU" smtClean="0"/>
+              <a:pPr/>
+              <a:t>32</a:t>
+            </a:fld>
+            <a:endParaRPr lang="en-AU"/>
+          </a:p>
+        </p:txBody>
+      </p:sp>
+    </p:spTree>
+    <p:extLst>
+      <p:ext uri="{BB962C8B-B14F-4D97-AF65-F5344CB8AC3E}">
+        <p14:creationId xmlns:p14="http://schemas.microsoft.com/office/powerpoint/2010/main" val="2784793927"/>
+      </p:ext>
+    </p:extLst>
+  </p:cSld>
+  <p:clrMapOvr>
+    <a:masterClrMapping/>
+  </p:clrMapOvr>
+</p:notes>
+</file>
+
+<file path=ppt/notesSlides/notesSlide32.xml><?xml version="1.0" encoding="utf-8"?>
+<p:notes xmlns:a="http://schemas.openxmlformats.org/drawingml/2006/main" xmlns:r="http://schemas.openxmlformats.org/officeDocument/2006/relationships" xmlns:p="http://schemas.openxmlformats.org/presentationml/2006/main">
+  <p:cSld>
+    <p:spTree>
+      <p:nvGrpSpPr>
+        <p:cNvPr id="1" name="">
+          <a:extLst>
+            <a:ext uri="{FF2B5EF4-FFF2-40B4-BE49-F238E27FC236}">
+              <a16:creationId xmlns:a16="http://schemas.microsoft.com/office/drawing/2014/main" id="{884E8555-0ED6-F10E-3374-F34FA6982F53}"/>
+            </a:ext>
+          </a:extLst>
+        </p:cNvPr>
+        <p:cNvGrpSpPr/>
+        <p:nvPr/>
+      </p:nvGrpSpPr>
+      <p:grpSpPr>
+        <a:xfrm>
+          <a:off x="0" y="0"/>
+          <a:ext cx="0" cy="0"/>
+          <a:chOff x="0" y="0"/>
+          <a:chExt cx="0" cy="0"/>
+        </a:xfrm>
+      </p:grpSpPr>
+      <p:sp>
+        <p:nvSpPr>
+          <p:cNvPr id="2" name="Slide Image Placeholder 1">
+            <a:extLst>
+              <a:ext uri="{FF2B5EF4-FFF2-40B4-BE49-F238E27FC236}">
+                <a16:creationId xmlns:a16="http://schemas.microsoft.com/office/drawing/2014/main" id="{CB081326-AB4F-E4CD-536D-26EDF1C6BDDF}"/>
+              </a:ext>
+            </a:extLst>
+          </p:cNvPr>
+          <p:cNvSpPr>
+            <a:spLocks noGrp="1" noRot="1" noChangeAspect="1"/>
+          </p:cNvSpPr>
+          <p:nvPr>
+            <p:ph type="sldImg"/>
+          </p:nvPr>
+        </p:nvSpPr>
+        <p:spPr/>
+      </p:sp>
+      <p:sp>
+        <p:nvSpPr>
+          <p:cNvPr id="3" name="Notes Placeholder 2">
+            <a:extLst>
+              <a:ext uri="{FF2B5EF4-FFF2-40B4-BE49-F238E27FC236}">
+                <a16:creationId xmlns:a16="http://schemas.microsoft.com/office/drawing/2014/main" id="{DA27B805-2152-ACDA-167B-D309F566A1BF}"/>
+              </a:ext>
+            </a:extLst>
+          </p:cNvPr>
+          <p:cNvSpPr>
+            <a:spLocks noGrp="1"/>
+          </p:cNvSpPr>
+          <p:nvPr>
+            <p:ph type="body" idx="1"/>
+          </p:nvPr>
+        </p:nvSpPr>
+        <p:spPr/>
+        <p:txBody>
+          <a:bodyPr/>
+          <a:lstStyle/>
+          <a:p>
+            <a:r>
+              <a:rPr lang="en-US" dirty="0"/>
+              <a:t>XXX</a:t>
+            </a:r>
+            <a:endParaRPr lang="en-NZ" dirty="0"/>
+          </a:p>
+        </p:txBody>
+      </p:sp>
+      <p:sp>
+        <p:nvSpPr>
+          <p:cNvPr id="4" name="Slide Number Placeholder 3">
+            <a:extLst>
+              <a:ext uri="{FF2B5EF4-FFF2-40B4-BE49-F238E27FC236}">
+                <a16:creationId xmlns:a16="http://schemas.microsoft.com/office/drawing/2014/main" id="{DC2A09A5-7110-9D88-38B3-AFEAE167FACF}"/>
+              </a:ext>
+            </a:extLst>
+          </p:cNvPr>
+          <p:cNvSpPr>
+            <a:spLocks noGrp="1"/>
+          </p:cNvSpPr>
+          <p:nvPr>
+            <p:ph type="sldNum" sz="quarter" idx="5"/>
+          </p:nvPr>
+        </p:nvSpPr>
+        <p:spPr/>
+        <p:txBody>
+          <a:bodyPr/>
+          <a:lstStyle/>
+          <a:p>
+            <a:fld id="{22FC436C-5653-4517-9B94-0BB68ACE2454}" type="slidenum">
+              <a:rPr lang="en-AU" smtClean="0"/>
+              <a:pPr/>
+              <a:t>33</a:t>
+            </a:fld>
+            <a:endParaRPr lang="en-AU"/>
+          </a:p>
+        </p:txBody>
+      </p:sp>
+    </p:spTree>
+    <p:extLst>
+      <p:ext uri="{BB962C8B-B14F-4D97-AF65-F5344CB8AC3E}">
+        <p14:creationId xmlns:p14="http://schemas.microsoft.com/office/powerpoint/2010/main" val="2067029904"/>
+      </p:ext>
+    </p:extLst>
+  </p:cSld>
+  <p:clrMapOvr>
+    <a:masterClrMapping/>
+  </p:clrMapOvr>
+</p:notes>
+</file>
+
+<file path=ppt/notesSlides/notesSlide33.xml><?xml version="1.0" encoding="utf-8"?>
+<p:notes xmlns:a="http://schemas.openxmlformats.org/drawingml/2006/main" xmlns:r="http://schemas.openxmlformats.org/officeDocument/2006/relationships" xmlns:p="http://schemas.openxmlformats.org/presentationml/2006/main">
+  <p:cSld>
+    <p:spTree>
+      <p:nvGrpSpPr>
         <p:cNvPr id="1" name=""/>
         <p:cNvGrpSpPr/>
         <p:nvPr/>
@@ -5386,7 +5741,7 @@
             <a:fld id="{22FC436C-5653-4517-9B94-0BB68ACE2454}" type="slidenum">
               <a:rPr lang="en-AU" smtClean="0"/>
               <a:pPr/>
-              <a:t>31</a:t>
+              <a:t>34</a:t>
             </a:fld>
             <a:endParaRPr lang="en-AU"/>
           </a:p>
@@ -5405,7 +5760,7 @@
 </p:notes>
 </file>
 
-<file path=ppt/notesSlides/notesSlide31.xml><?xml version="1.0" encoding="utf-8"?>
+<file path=ppt/notesSlides/notesSlide34.xml><?xml version="1.0" encoding="utf-8"?>
 <p:notes xmlns:a="http://schemas.openxmlformats.org/drawingml/2006/main" xmlns:r="http://schemas.openxmlformats.org/officeDocument/2006/relationships" xmlns:p="http://schemas.openxmlformats.org/presentationml/2006/main">
   <p:cSld>
     <p:spTree>
@@ -5471,7 +5826,7 @@
             <a:fld id="{22FC436C-5653-4517-9B94-0BB68ACE2454}" type="slidenum">
               <a:rPr lang="en-AU" smtClean="0"/>
               <a:pPr/>
-              <a:t>32</a:t>
+              <a:t>35</a:t>
             </a:fld>
             <a:endParaRPr lang="en-AU"/>
           </a:p>
@@ -7494,7 +7849,7 @@
           <a:p>
             <a:fld id="{A09C5C50-442C-4270-89D8-174894833343}" type="datetime1">
               <a:rPr lang="en-AU" smtClean="0"/>
-              <a:t>26/11/2024</a:t>
+              <a:t>30/11/2024</a:t>
             </a:fld>
             <a:endParaRPr lang="en-AU" dirty="0"/>
           </a:p>
@@ -10287,7 +10642,7 @@
           <a:p>
             <a:fld id="{A09C5C50-442C-4270-89D8-174894833343}" type="datetime1">
               <a:rPr lang="en-AU" smtClean="0"/>
-              <a:t>26/11/2024</a:t>
+              <a:t>30/11/2024</a:t>
             </a:fld>
             <a:endParaRPr lang="en-AU" dirty="0"/>
           </a:p>
@@ -10550,7 +10905,7 @@
           <a:p>
             <a:fld id="{A09C5C50-442C-4270-89D8-174894833343}" type="datetime1">
               <a:rPr lang="en-AU" smtClean="0"/>
-              <a:t>26/11/2024</a:t>
+              <a:t>30/11/2024</a:t>
             </a:fld>
             <a:endParaRPr lang="en-AU" dirty="0"/>
           </a:p>
@@ -10767,7 +11122,7 @@
           <a:p>
             <a:fld id="{A09C5C50-442C-4270-89D8-174894833343}" type="datetime1">
               <a:rPr lang="en-AU" smtClean="0"/>
-              <a:t>26/11/2024</a:t>
+              <a:t>30/11/2024</a:t>
             </a:fld>
             <a:endParaRPr lang="en-AU" dirty="0"/>
           </a:p>
@@ -11243,7 +11598,7 @@
           <a:p>
             <a:fld id="{A09C5C50-442C-4270-89D8-174894833343}" type="datetime1">
               <a:rPr lang="en-AU" smtClean="0"/>
-              <a:t>26/11/2024</a:t>
+              <a:t>30/11/2024</a:t>
             </a:fld>
             <a:endParaRPr lang="en-AU" dirty="0"/>
           </a:p>
@@ -11604,7 +11959,7 @@
           <a:p>
             <a:fld id="{A09C5C50-442C-4270-89D8-174894833343}" type="datetime1">
               <a:rPr lang="en-AU" smtClean="0"/>
-              <a:t>26/11/2024</a:t>
+              <a:t>30/11/2024</a:t>
             </a:fld>
             <a:endParaRPr lang="en-AU" dirty="0"/>
           </a:p>
@@ -12101,7 +12456,7 @@
           <a:p>
             <a:fld id="{A09C5C50-442C-4270-89D8-174894833343}" type="datetime1">
               <a:rPr lang="en-AU" smtClean="0"/>
-              <a:t>26/11/2024</a:t>
+              <a:t>30/11/2024</a:t>
             </a:fld>
             <a:endParaRPr lang="en-AU" dirty="0"/>
           </a:p>
@@ -12764,7 +13119,7 @@
           <a:p>
             <a:fld id="{A09C5C50-442C-4270-89D8-174894833343}" type="datetime1">
               <a:rPr lang="en-AU" smtClean="0"/>
-              <a:t>26/11/2024</a:t>
+              <a:t>30/11/2024</a:t>
             </a:fld>
             <a:endParaRPr lang="en-AU" dirty="0"/>
           </a:p>
@@ -12934,7 +13289,7 @@
           <a:p>
             <a:fld id="{A09C5C50-442C-4270-89D8-174894833343}" type="datetime1">
               <a:rPr lang="en-AU" smtClean="0"/>
-              <a:t>26/11/2024</a:t>
+              <a:t>30/11/2024</a:t>
             </a:fld>
             <a:endParaRPr lang="en-AU" dirty="0"/>
           </a:p>
@@ -13121,7 +13476,7 @@
           <a:p>
             <a:fld id="{A09C5C50-442C-4270-89D8-174894833343}" type="datetime1">
               <a:rPr lang="en-AU" smtClean="0"/>
-              <a:t>26/11/2024</a:t>
+              <a:t>30/11/2024</a:t>
             </a:fld>
             <a:endParaRPr lang="en-AU" dirty="0"/>
           </a:p>
@@ -13393,7 +13748,7 @@
           <a:p>
             <a:fld id="{A09C5C50-442C-4270-89D8-174894833343}" type="datetime1">
               <a:rPr lang="en-AU" smtClean="0"/>
-              <a:t>26/11/2024</a:t>
+              <a:t>30/11/2024</a:t>
             </a:fld>
             <a:endParaRPr lang="en-AU" dirty="0"/>
           </a:p>
@@ -17183,6 +17538,629 @@
           <p:cNvPr id="2" name="Title 1">
             <a:extLst>
               <a:ext uri="{FF2B5EF4-FFF2-40B4-BE49-F238E27FC236}">
+                <a16:creationId xmlns:a16="http://schemas.microsoft.com/office/drawing/2014/main" id="{6C87496E-41B5-BE8E-FF4E-04E12409F73F}"/>
+              </a:ext>
+            </a:extLst>
+          </p:cNvPr>
+          <p:cNvSpPr>
+            <a:spLocks noGrp="1"/>
+          </p:cNvSpPr>
+          <p:nvPr>
+            <p:ph type="title"/>
+          </p:nvPr>
+        </p:nvSpPr>
+        <p:spPr/>
+        <p:txBody>
+          <a:bodyPr/>
+          <a:lstStyle/>
+          <a:p>
+            <a:r>
+              <a:rPr lang="en-US" dirty="0"/>
+              <a:t>Types of games</a:t>
+            </a:r>
+            <a:endParaRPr lang="en-NZ" dirty="0"/>
+          </a:p>
+        </p:txBody>
+      </p:sp>
+      <p:sp>
+        <p:nvSpPr>
+          <p:cNvPr id="5" name="TextBox 4">
+            <a:extLst>
+              <a:ext uri="{FF2B5EF4-FFF2-40B4-BE49-F238E27FC236}">
+                <a16:creationId xmlns:a16="http://schemas.microsoft.com/office/drawing/2014/main" id="{559E05F8-D9A6-3AC0-10C3-342E1693A5FE}"/>
+              </a:ext>
+            </a:extLst>
+          </p:cNvPr>
+          <p:cNvSpPr txBox="1"/>
+          <p:nvPr/>
+        </p:nvSpPr>
+        <p:spPr>
+          <a:xfrm>
+            <a:off x="539552" y="2427734"/>
+            <a:ext cx="1584176" cy="646331"/>
+          </a:xfrm>
+          <a:prstGeom prst="rect">
+            <a:avLst/>
+          </a:prstGeom>
+          <a:noFill/>
+        </p:spPr>
+        <p:txBody>
+          <a:bodyPr wrap="square" rtlCol="0">
+            <a:spAutoFit/>
+          </a:bodyPr>
+          <a:lstStyle/>
+          <a:p>
+            <a:r>
+              <a:rPr lang="en-US" dirty="0"/>
+              <a:t>Symmetry of objectives</a:t>
+            </a:r>
+            <a:endParaRPr lang="en-NZ" dirty="0"/>
+          </a:p>
+        </p:txBody>
+      </p:sp>
+      <p:sp>
+        <p:nvSpPr>
+          <p:cNvPr id="6" name="TextBox 5">
+            <a:extLst>
+              <a:ext uri="{FF2B5EF4-FFF2-40B4-BE49-F238E27FC236}">
+                <a16:creationId xmlns:a16="http://schemas.microsoft.com/office/drawing/2014/main" id="{91595D45-2DD0-4506-9BAE-7D192BB06FFA}"/>
+              </a:ext>
+            </a:extLst>
+          </p:cNvPr>
+          <p:cNvSpPr txBox="1"/>
+          <p:nvPr/>
+        </p:nvSpPr>
+        <p:spPr>
+          <a:xfrm>
+            <a:off x="4211960" y="771550"/>
+            <a:ext cx="2749471" cy="369332"/>
+          </a:xfrm>
+          <a:prstGeom prst="rect">
+            <a:avLst/>
+          </a:prstGeom>
+          <a:noFill/>
+        </p:spPr>
+        <p:txBody>
+          <a:bodyPr wrap="none" rtlCol="0">
+            <a:spAutoFit/>
+          </a:bodyPr>
+          <a:lstStyle/>
+          <a:p>
+            <a:r>
+              <a:rPr lang="en-US" dirty="0"/>
+              <a:t>Demand v supply shocks</a:t>
+            </a:r>
+            <a:endParaRPr lang="en-NZ" dirty="0"/>
+          </a:p>
+        </p:txBody>
+      </p:sp>
+      <p:sp>
+        <p:nvSpPr>
+          <p:cNvPr id="7" name="TextBox 6">
+            <a:extLst>
+              <a:ext uri="{FF2B5EF4-FFF2-40B4-BE49-F238E27FC236}">
+                <a16:creationId xmlns:a16="http://schemas.microsoft.com/office/drawing/2014/main" id="{EAC0B0E3-AEB8-E27C-F725-1FDC7DB4F4F6}"/>
+              </a:ext>
+            </a:extLst>
+          </p:cNvPr>
+          <p:cNvSpPr txBox="1"/>
+          <p:nvPr/>
+        </p:nvSpPr>
+        <p:spPr>
+          <a:xfrm>
+            <a:off x="2555776" y="2067694"/>
+            <a:ext cx="1274708" cy="369332"/>
+          </a:xfrm>
+          <a:prstGeom prst="rect">
+            <a:avLst/>
+          </a:prstGeom>
+          <a:noFill/>
+        </p:spPr>
+        <p:txBody>
+          <a:bodyPr wrap="none" rtlCol="0">
+            <a:spAutoFit/>
+          </a:bodyPr>
+          <a:lstStyle/>
+          <a:p>
+            <a:r>
+              <a:rPr lang="en-US" dirty="0"/>
+              <a:t>Symmetric</a:t>
+            </a:r>
+            <a:endParaRPr lang="en-NZ" dirty="0"/>
+          </a:p>
+        </p:txBody>
+      </p:sp>
+      <p:sp>
+        <p:nvSpPr>
+          <p:cNvPr id="8" name="TextBox 7">
+            <a:extLst>
+              <a:ext uri="{FF2B5EF4-FFF2-40B4-BE49-F238E27FC236}">
+                <a16:creationId xmlns:a16="http://schemas.microsoft.com/office/drawing/2014/main" id="{85C04661-120E-8693-E94A-4DBAD6E57A61}"/>
+              </a:ext>
+            </a:extLst>
+          </p:cNvPr>
+          <p:cNvSpPr txBox="1"/>
+          <p:nvPr/>
+        </p:nvSpPr>
+        <p:spPr>
+          <a:xfrm>
+            <a:off x="2558556" y="2859781"/>
+            <a:ext cx="1390124" cy="369332"/>
+          </a:xfrm>
+          <a:prstGeom prst="rect">
+            <a:avLst/>
+          </a:prstGeom>
+          <a:noFill/>
+        </p:spPr>
+        <p:txBody>
+          <a:bodyPr wrap="none" rtlCol="0">
+            <a:spAutoFit/>
+          </a:bodyPr>
+          <a:lstStyle/>
+          <a:p>
+            <a:r>
+              <a:rPr lang="en-US" dirty="0"/>
+              <a:t>Asymmetric</a:t>
+            </a:r>
+            <a:endParaRPr lang="en-NZ" dirty="0"/>
+          </a:p>
+        </p:txBody>
+      </p:sp>
+      <p:sp>
+        <p:nvSpPr>
+          <p:cNvPr id="9" name="TextBox 8">
+            <a:extLst>
+              <a:ext uri="{FF2B5EF4-FFF2-40B4-BE49-F238E27FC236}">
+                <a16:creationId xmlns:a16="http://schemas.microsoft.com/office/drawing/2014/main" id="{A7F31F6F-C042-7260-0EF3-ED30E7E24B7E}"/>
+              </a:ext>
+            </a:extLst>
+          </p:cNvPr>
+          <p:cNvSpPr txBox="1"/>
+          <p:nvPr/>
+        </p:nvSpPr>
+        <p:spPr>
+          <a:xfrm>
+            <a:off x="4355976" y="1275606"/>
+            <a:ext cx="1056700" cy="369332"/>
+          </a:xfrm>
+          <a:prstGeom prst="rect">
+            <a:avLst/>
+          </a:prstGeom>
+          <a:noFill/>
+        </p:spPr>
+        <p:txBody>
+          <a:bodyPr wrap="none" rtlCol="0">
+            <a:spAutoFit/>
+          </a:bodyPr>
+          <a:lstStyle/>
+          <a:p>
+            <a:r>
+              <a:rPr lang="en-US" dirty="0"/>
+              <a:t>Demand</a:t>
+            </a:r>
+            <a:endParaRPr lang="en-NZ" dirty="0"/>
+          </a:p>
+        </p:txBody>
+      </p:sp>
+      <p:sp>
+        <p:nvSpPr>
+          <p:cNvPr id="10" name="TextBox 9">
+            <a:extLst>
+              <a:ext uri="{FF2B5EF4-FFF2-40B4-BE49-F238E27FC236}">
+                <a16:creationId xmlns:a16="http://schemas.microsoft.com/office/drawing/2014/main" id="{7BEBA3A7-427D-3CF5-87B4-0503DB313365}"/>
+              </a:ext>
+            </a:extLst>
+          </p:cNvPr>
+          <p:cNvSpPr txBox="1"/>
+          <p:nvPr/>
+        </p:nvSpPr>
+        <p:spPr>
+          <a:xfrm>
+            <a:off x="6071444" y="1251231"/>
+            <a:ext cx="889987" cy="369332"/>
+          </a:xfrm>
+          <a:prstGeom prst="rect">
+            <a:avLst/>
+          </a:prstGeom>
+          <a:noFill/>
+        </p:spPr>
+        <p:txBody>
+          <a:bodyPr wrap="none" rtlCol="0">
+            <a:spAutoFit/>
+          </a:bodyPr>
+          <a:lstStyle/>
+          <a:p>
+            <a:r>
+              <a:rPr lang="en-US" dirty="0"/>
+              <a:t>Supply</a:t>
+            </a:r>
+            <a:endParaRPr lang="en-NZ" dirty="0"/>
+          </a:p>
+        </p:txBody>
+      </p:sp>
+      <p:cxnSp>
+        <p:nvCxnSpPr>
+          <p:cNvPr id="12" name="Straight Connector 11">
+            <a:extLst>
+              <a:ext uri="{FF2B5EF4-FFF2-40B4-BE49-F238E27FC236}">
+                <a16:creationId xmlns:a16="http://schemas.microsoft.com/office/drawing/2014/main" id="{CC37FFF5-16A6-95CA-BFDF-2C39F892E30D}"/>
+              </a:ext>
+            </a:extLst>
+          </p:cNvPr>
+          <p:cNvCxnSpPr/>
+          <p:nvPr/>
+        </p:nvCxnSpPr>
+        <p:spPr>
+          <a:xfrm>
+            <a:off x="4139952" y="627534"/>
+            <a:ext cx="0" cy="2952328"/>
+          </a:xfrm>
+          <a:prstGeom prst="line">
+            <a:avLst/>
+          </a:prstGeom>
+        </p:spPr>
+        <p:style>
+          <a:lnRef idx="2">
+            <a:schemeClr val="accent1"/>
+          </a:lnRef>
+          <a:fillRef idx="0">
+            <a:schemeClr val="accent1"/>
+          </a:fillRef>
+          <a:effectRef idx="1">
+            <a:schemeClr val="accent1"/>
+          </a:effectRef>
+          <a:fontRef idx="minor">
+            <a:schemeClr val="tx1"/>
+          </a:fontRef>
+        </p:style>
+      </p:cxnSp>
+      <p:cxnSp>
+        <p:nvCxnSpPr>
+          <p:cNvPr id="13" name="Straight Connector 12">
+            <a:extLst>
+              <a:ext uri="{FF2B5EF4-FFF2-40B4-BE49-F238E27FC236}">
+                <a16:creationId xmlns:a16="http://schemas.microsoft.com/office/drawing/2014/main" id="{BF62B95D-D623-47B3-35CC-E75370B55511}"/>
+              </a:ext>
+            </a:extLst>
+          </p:cNvPr>
+          <p:cNvCxnSpPr>
+            <a:cxnSpLocks/>
+          </p:cNvCxnSpPr>
+          <p:nvPr/>
+        </p:nvCxnSpPr>
+        <p:spPr>
+          <a:xfrm>
+            <a:off x="3563888" y="1707654"/>
+            <a:ext cx="3888432" cy="0"/>
+          </a:xfrm>
+          <a:prstGeom prst="line">
+            <a:avLst/>
+          </a:prstGeom>
+        </p:spPr>
+        <p:style>
+          <a:lnRef idx="2">
+            <a:schemeClr val="accent1"/>
+          </a:lnRef>
+          <a:fillRef idx="0">
+            <a:schemeClr val="accent1"/>
+          </a:fillRef>
+          <a:effectRef idx="1">
+            <a:schemeClr val="accent1"/>
+          </a:effectRef>
+          <a:fontRef idx="minor">
+            <a:schemeClr val="tx1"/>
+          </a:fontRef>
+        </p:style>
+      </p:cxnSp>
+      <p:cxnSp>
+        <p:nvCxnSpPr>
+          <p:cNvPr id="15" name="Straight Connector 14">
+            <a:extLst>
+              <a:ext uri="{FF2B5EF4-FFF2-40B4-BE49-F238E27FC236}">
+                <a16:creationId xmlns:a16="http://schemas.microsoft.com/office/drawing/2014/main" id="{12B0DFEC-E10B-A660-F4AD-F5CE1B97CED0}"/>
+              </a:ext>
+            </a:extLst>
+          </p:cNvPr>
+          <p:cNvCxnSpPr>
+            <a:cxnSpLocks/>
+          </p:cNvCxnSpPr>
+          <p:nvPr/>
+        </p:nvCxnSpPr>
+        <p:spPr>
+          <a:xfrm flipV="1">
+            <a:off x="3563888" y="2499742"/>
+            <a:ext cx="3816424" cy="48980"/>
+          </a:xfrm>
+          <a:prstGeom prst="line">
+            <a:avLst/>
+          </a:prstGeom>
+        </p:spPr>
+        <p:style>
+          <a:lnRef idx="2">
+            <a:schemeClr val="accent1"/>
+          </a:lnRef>
+          <a:fillRef idx="0">
+            <a:schemeClr val="accent1"/>
+          </a:fillRef>
+          <a:effectRef idx="1">
+            <a:schemeClr val="accent1"/>
+          </a:effectRef>
+          <a:fontRef idx="minor">
+            <a:schemeClr val="tx1"/>
+          </a:fontRef>
+        </p:style>
+      </p:cxnSp>
+      <p:cxnSp>
+        <p:nvCxnSpPr>
+          <p:cNvPr id="16" name="Straight Connector 15">
+            <a:extLst>
+              <a:ext uri="{FF2B5EF4-FFF2-40B4-BE49-F238E27FC236}">
+                <a16:creationId xmlns:a16="http://schemas.microsoft.com/office/drawing/2014/main" id="{E57A2848-C17E-189D-7025-0C776785AF89}"/>
+              </a:ext>
+            </a:extLst>
+          </p:cNvPr>
+          <p:cNvCxnSpPr>
+            <a:cxnSpLocks/>
+          </p:cNvCxnSpPr>
+          <p:nvPr/>
+        </p:nvCxnSpPr>
+        <p:spPr>
+          <a:xfrm>
+            <a:off x="5724128" y="1203598"/>
+            <a:ext cx="0" cy="2376264"/>
+          </a:xfrm>
+          <a:prstGeom prst="line">
+            <a:avLst/>
+          </a:prstGeom>
+        </p:spPr>
+        <p:style>
+          <a:lnRef idx="2">
+            <a:schemeClr val="accent1"/>
+          </a:lnRef>
+          <a:fillRef idx="0">
+            <a:schemeClr val="accent1"/>
+          </a:fillRef>
+          <a:effectRef idx="1">
+            <a:schemeClr val="accent1"/>
+          </a:effectRef>
+          <a:fontRef idx="minor">
+            <a:schemeClr val="tx1"/>
+          </a:fontRef>
+        </p:style>
+      </p:cxnSp>
+      <p:sp>
+        <p:nvSpPr>
+          <p:cNvPr id="20" name="TextBox 19">
+            <a:extLst>
+              <a:ext uri="{FF2B5EF4-FFF2-40B4-BE49-F238E27FC236}">
+                <a16:creationId xmlns:a16="http://schemas.microsoft.com/office/drawing/2014/main" id="{EDADF7E7-B354-182E-B3BC-346211F81BA7}"/>
+              </a:ext>
+            </a:extLst>
+          </p:cNvPr>
+          <p:cNvSpPr txBox="1"/>
+          <p:nvPr/>
+        </p:nvSpPr>
+        <p:spPr>
+          <a:xfrm>
+            <a:off x="4204918" y="1982913"/>
+            <a:ext cx="1454244" cy="276999"/>
+          </a:xfrm>
+          <a:prstGeom prst="rect">
+            <a:avLst/>
+          </a:prstGeom>
+          <a:noFill/>
+        </p:spPr>
+        <p:txBody>
+          <a:bodyPr wrap="none" rtlCol="0">
+            <a:spAutoFit/>
+          </a:bodyPr>
+          <a:lstStyle/>
+          <a:p>
+            <a:r>
+              <a:rPr lang="en-US" sz="1200" dirty="0"/>
+              <a:t>Prisoners dilemma</a:t>
+            </a:r>
+            <a:endParaRPr lang="en-NZ" sz="1200" dirty="0"/>
+          </a:p>
+        </p:txBody>
+      </p:sp>
+      <p:sp>
+        <p:nvSpPr>
+          <p:cNvPr id="21" name="TextBox 20">
+            <a:extLst>
+              <a:ext uri="{FF2B5EF4-FFF2-40B4-BE49-F238E27FC236}">
+                <a16:creationId xmlns:a16="http://schemas.microsoft.com/office/drawing/2014/main" id="{478D75E3-35B8-AE24-DB8D-6EDF9FCCD99C}"/>
+              </a:ext>
+            </a:extLst>
+          </p:cNvPr>
+          <p:cNvSpPr txBox="1"/>
+          <p:nvPr/>
+        </p:nvSpPr>
+        <p:spPr>
+          <a:xfrm>
+            <a:off x="4157204" y="2797066"/>
+            <a:ext cx="1454244" cy="276999"/>
+          </a:xfrm>
+          <a:prstGeom prst="rect">
+            <a:avLst/>
+          </a:prstGeom>
+          <a:noFill/>
+        </p:spPr>
+        <p:txBody>
+          <a:bodyPr wrap="none" rtlCol="0">
+            <a:spAutoFit/>
+          </a:bodyPr>
+          <a:lstStyle/>
+          <a:p>
+            <a:r>
+              <a:rPr lang="en-US" sz="1200" dirty="0"/>
+              <a:t>Prisoners dilemma</a:t>
+            </a:r>
+            <a:endParaRPr lang="en-NZ" sz="1200" dirty="0"/>
+          </a:p>
+        </p:txBody>
+      </p:sp>
+      <p:sp>
+        <p:nvSpPr>
+          <p:cNvPr id="22" name="TextBox 21">
+            <a:extLst>
+              <a:ext uri="{FF2B5EF4-FFF2-40B4-BE49-F238E27FC236}">
+                <a16:creationId xmlns:a16="http://schemas.microsoft.com/office/drawing/2014/main" id="{238AC711-4355-CA7D-F467-CDF49395AA9D}"/>
+              </a:ext>
+            </a:extLst>
+          </p:cNvPr>
+          <p:cNvSpPr txBox="1"/>
+          <p:nvPr/>
+        </p:nvSpPr>
+        <p:spPr>
+          <a:xfrm>
+            <a:off x="5924885" y="1996983"/>
+            <a:ext cx="1454244" cy="276999"/>
+          </a:xfrm>
+          <a:prstGeom prst="rect">
+            <a:avLst/>
+          </a:prstGeom>
+          <a:noFill/>
+        </p:spPr>
+        <p:txBody>
+          <a:bodyPr wrap="none" rtlCol="0">
+            <a:spAutoFit/>
+          </a:bodyPr>
+          <a:lstStyle/>
+          <a:p>
+            <a:r>
+              <a:rPr lang="en-US" sz="1200" dirty="0"/>
+              <a:t>Prisoners dilemma</a:t>
+            </a:r>
+            <a:endParaRPr lang="en-NZ" sz="1200" dirty="0"/>
+          </a:p>
+        </p:txBody>
+      </p:sp>
+      <p:sp>
+        <p:nvSpPr>
+          <p:cNvPr id="23" name="TextBox 22">
+            <a:extLst>
+              <a:ext uri="{FF2B5EF4-FFF2-40B4-BE49-F238E27FC236}">
+                <a16:creationId xmlns:a16="http://schemas.microsoft.com/office/drawing/2014/main" id="{0D8BEB42-3F21-1D23-298F-585EDADC09CA}"/>
+              </a:ext>
+            </a:extLst>
+          </p:cNvPr>
+          <p:cNvSpPr txBox="1"/>
+          <p:nvPr/>
+        </p:nvSpPr>
+        <p:spPr>
+          <a:xfrm>
+            <a:off x="5922900" y="2802550"/>
+            <a:ext cx="1529417" cy="461665"/>
+          </a:xfrm>
+          <a:prstGeom prst="rect">
+            <a:avLst/>
+          </a:prstGeom>
+          <a:noFill/>
+        </p:spPr>
+        <p:txBody>
+          <a:bodyPr wrap="square" rtlCol="0">
+            <a:spAutoFit/>
+          </a:bodyPr>
+          <a:lstStyle/>
+          <a:p>
+            <a:r>
+              <a:rPr lang="en-US" sz="1200" dirty="0"/>
+              <a:t>Coordination/offset game</a:t>
+            </a:r>
+            <a:endParaRPr lang="en-NZ" sz="1200" dirty="0"/>
+          </a:p>
+        </p:txBody>
+      </p:sp>
+      <p:sp>
+        <p:nvSpPr>
+          <p:cNvPr id="24" name="TextBox 23">
+            <a:extLst>
+              <a:ext uri="{FF2B5EF4-FFF2-40B4-BE49-F238E27FC236}">
+                <a16:creationId xmlns:a16="http://schemas.microsoft.com/office/drawing/2014/main" id="{F8101306-4127-6E1E-7F89-BFCEA01CD4B7}"/>
+              </a:ext>
+            </a:extLst>
+          </p:cNvPr>
+          <p:cNvSpPr txBox="1"/>
+          <p:nvPr/>
+        </p:nvSpPr>
+        <p:spPr>
+          <a:xfrm>
+            <a:off x="1218269" y="4035634"/>
+            <a:ext cx="6707462" cy="738664"/>
+          </a:xfrm>
+          <a:prstGeom prst="rect">
+            <a:avLst/>
+          </a:prstGeom>
+          <a:noFill/>
+        </p:spPr>
+        <p:txBody>
+          <a:bodyPr wrap="square" rtlCol="0">
+            <a:spAutoFit/>
+          </a:bodyPr>
+          <a:lstStyle/>
+          <a:p>
+            <a:pPr marL="285750" indent="-285750">
+              <a:buFont typeface="Arial" panose="020B0604020202020204" pitchFamily="34" charset="0"/>
+              <a:buChar char="•"/>
+            </a:pPr>
+            <a:r>
+              <a:rPr lang="en-US" sz="1400" dirty="0"/>
+              <a:t>Responses will differ. Role of pre-commitment/“instrument stickiness” will differ.</a:t>
+            </a:r>
+            <a:br>
+              <a:rPr lang="en-US" sz="1400" dirty="0"/>
+            </a:br>
+            <a:endParaRPr lang="en-US" sz="1400" dirty="0"/>
+          </a:p>
+          <a:p>
+            <a:pPr marL="285750" indent="-285750">
+              <a:buFont typeface="Arial" panose="020B0604020202020204" pitchFamily="34" charset="0"/>
+              <a:buChar char="•"/>
+            </a:pPr>
+            <a:r>
+              <a:rPr lang="en-US" sz="1400" dirty="0"/>
+              <a:t>Varying costs of adjustment also change the cost/benefit of pre-commitment.</a:t>
+            </a:r>
+            <a:endParaRPr lang="en-NZ" sz="1400" dirty="0"/>
+          </a:p>
+        </p:txBody>
+      </p:sp>
+    </p:spTree>
+    <p:extLst>
+      <p:ext uri="{BB962C8B-B14F-4D97-AF65-F5344CB8AC3E}">
+        <p14:creationId xmlns:p14="http://schemas.microsoft.com/office/powerpoint/2010/main" val="4004552267"/>
+      </p:ext>
+    </p:extLst>
+  </p:cSld>
+  <p:clrMapOvr>
+    <a:masterClrMapping/>
+  </p:clrMapOvr>
+</p:sld>
+</file>
+
+<file path=ppt/slides/slide15.xml><?xml version="1.0" encoding="utf-8"?>
+<p:sld xmlns:a="http://schemas.openxmlformats.org/drawingml/2006/main" xmlns:r="http://schemas.openxmlformats.org/officeDocument/2006/relationships" xmlns:p="http://schemas.openxmlformats.org/presentationml/2006/main">
+  <p:cSld>
+    <p:spTree>
+      <p:nvGrpSpPr>
+        <p:cNvPr id="1" name=""/>
+        <p:cNvGrpSpPr/>
+        <p:nvPr/>
+      </p:nvGrpSpPr>
+      <p:grpSpPr>
+        <a:xfrm>
+          <a:off x="0" y="0"/>
+          <a:ext cx="0" cy="0"/>
+          <a:chOff x="0" y="0"/>
+          <a:chExt cx="0" cy="0"/>
+        </a:xfrm>
+      </p:grpSpPr>
+      <p:sp>
+        <p:nvSpPr>
+          <p:cNvPr id="2" name="Title 1">
+            <a:extLst>
+              <a:ext uri="{FF2B5EF4-FFF2-40B4-BE49-F238E27FC236}">
                 <a16:creationId xmlns:a16="http://schemas.microsoft.com/office/drawing/2014/main" id="{B483358D-CEBF-4653-C0E1-26237DDB4FB5}"/>
               </a:ext>
             </a:extLst>
@@ -18459,7 +19437,7 @@
 </p:sld>
 </file>
 
-<file path=ppt/slides/slide15.xml><?xml version="1.0" encoding="utf-8"?>
+<file path=ppt/slides/slide16.xml><?xml version="1.0" encoding="utf-8"?>
 <p:sld xmlns:a="http://schemas.openxmlformats.org/drawingml/2006/main" xmlns:r="http://schemas.openxmlformats.org/officeDocument/2006/relationships" xmlns:p="http://schemas.openxmlformats.org/presentationml/2006/main">
   <p:cSld>
     <p:spTree>
@@ -18575,7 +19553,7 @@
 </p:sld>
 </file>
 
-<file path=ppt/slides/slide16.xml><?xml version="1.0" encoding="utf-8"?>
+<file path=ppt/slides/slide17.xml><?xml version="1.0" encoding="utf-8"?>
 <p:sld xmlns:a="http://schemas.openxmlformats.org/drawingml/2006/main" xmlns:r="http://schemas.openxmlformats.org/officeDocument/2006/relationships" xmlns:p="http://schemas.openxmlformats.org/presentationml/2006/main">
   <p:cSld>
     <p:spTree>
@@ -18691,7 +19669,7 @@
 </p:sld>
 </file>
 
-<file path=ppt/slides/slide17.xml><?xml version="1.0" encoding="utf-8"?>
+<file path=ppt/slides/slide18.xml><?xml version="1.0" encoding="utf-8"?>
 <p:sld xmlns:a="http://schemas.openxmlformats.org/drawingml/2006/main" xmlns:r="http://schemas.openxmlformats.org/officeDocument/2006/relationships" xmlns:p="http://schemas.openxmlformats.org/presentationml/2006/main">
   <p:cSld>
     <p:spTree>
@@ -19928,7 +20906,7 @@
 </p:sld>
 </file>
 
-<file path=ppt/slides/slide18.xml><?xml version="1.0" encoding="utf-8"?>
+<file path=ppt/slides/slide19.xml><?xml version="1.0" encoding="utf-8"?>
 <p:sld xmlns:a="http://schemas.openxmlformats.org/drawingml/2006/main" xmlns:r="http://schemas.openxmlformats.org/officeDocument/2006/relationships" xmlns:p="http://schemas.openxmlformats.org/presentationml/2006/main">
   <p:cSld>
     <p:spTree>
@@ -20044,7 +21022,167 @@
 </p:sld>
 </file>
 
-<file path=ppt/slides/slide19.xml><?xml version="1.0" encoding="utf-8"?>
+<file path=ppt/slides/slide2.xml><?xml version="1.0" encoding="utf-8"?>
+<p:sld xmlns:a="http://schemas.openxmlformats.org/drawingml/2006/main" xmlns:r="http://schemas.openxmlformats.org/officeDocument/2006/relationships" xmlns:p="http://schemas.openxmlformats.org/presentationml/2006/main">
+  <p:cSld>
+    <p:spTree>
+      <p:nvGrpSpPr>
+        <p:cNvPr id="1" name="">
+          <a:extLst>
+            <a:ext uri="{FF2B5EF4-FFF2-40B4-BE49-F238E27FC236}">
+              <a16:creationId xmlns:a16="http://schemas.microsoft.com/office/drawing/2014/main" id="{213BA21E-40E0-C83B-B5B2-392226084C71}"/>
+            </a:ext>
+          </a:extLst>
+        </p:cNvPr>
+        <p:cNvGrpSpPr/>
+        <p:nvPr/>
+      </p:nvGrpSpPr>
+      <p:grpSpPr>
+        <a:xfrm>
+          <a:off x="0" y="0"/>
+          <a:ext cx="0" cy="0"/>
+          <a:chOff x="0" y="0"/>
+          <a:chExt cx="0" cy="0"/>
+        </a:xfrm>
+      </p:grpSpPr>
+      <p:sp>
+        <p:nvSpPr>
+          <p:cNvPr id="2" name="Title 1">
+            <a:extLst>
+              <a:ext uri="{FF2B5EF4-FFF2-40B4-BE49-F238E27FC236}">
+                <a16:creationId xmlns:a16="http://schemas.microsoft.com/office/drawing/2014/main" id="{6CDDA86D-53AF-B2DB-C0A2-22180B9363A6}"/>
+              </a:ext>
+            </a:extLst>
+          </p:cNvPr>
+          <p:cNvSpPr>
+            <a:spLocks noGrp="1"/>
+          </p:cNvSpPr>
+          <p:nvPr>
+            <p:ph type="title"/>
+          </p:nvPr>
+        </p:nvSpPr>
+        <p:spPr/>
+        <p:txBody>
+          <a:bodyPr/>
+          <a:lstStyle/>
+          <a:p>
+            <a:r>
+              <a:rPr lang="en-AU" dirty="0"/>
+              <a:t>Motivation</a:t>
+            </a:r>
+          </a:p>
+        </p:txBody>
+      </p:sp>
+      <p:sp>
+        <p:nvSpPr>
+          <p:cNvPr id="3" name="Content Placeholder 2">
+            <a:extLst>
+              <a:ext uri="{FF2B5EF4-FFF2-40B4-BE49-F238E27FC236}">
+                <a16:creationId xmlns:a16="http://schemas.microsoft.com/office/drawing/2014/main" id="{A945028C-DE28-5D34-A8A5-078B5529683E}"/>
+              </a:ext>
+            </a:extLst>
+          </p:cNvPr>
+          <p:cNvSpPr>
+            <a:spLocks noGrp="1"/>
+          </p:cNvSpPr>
+          <p:nvPr>
+            <p:ph sz="half" idx="1"/>
+          </p:nvPr>
+        </p:nvSpPr>
+        <p:spPr>
+          <a:xfrm>
+            <a:off x="313184" y="820588"/>
+            <a:ext cx="8521254" cy="4127425"/>
+          </a:xfrm>
+        </p:spPr>
+        <p:txBody>
+          <a:bodyPr>
+            <a:normAutofit fontScale="92500" lnSpcReduction="20000"/>
+          </a:bodyPr>
+          <a:lstStyle/>
+          <a:p>
+            <a:r>
+              <a:rPr lang="en-AU" dirty="0"/>
+              <a:t>In </a:t>
+            </a:r>
+            <a:r>
+              <a:rPr lang="en-AU" b="1" dirty="0"/>
+              <a:t>Recommendation 3</a:t>
+            </a:r>
+            <a:r>
+              <a:rPr lang="en-AU" dirty="0"/>
+              <a:t> of the RBA review, the importance of </a:t>
+            </a:r>
+            <a:r>
+              <a:rPr lang="en-AU" i="1" dirty="0"/>
+              <a:t>fiscal-monetary coordination</a:t>
+            </a:r>
+            <a:r>
+              <a:rPr lang="en-AU" dirty="0"/>
+              <a:t> was highlighted.</a:t>
+            </a:r>
+          </a:p>
+          <a:p>
+            <a:endParaRPr lang="en-AU" dirty="0"/>
+          </a:p>
+          <a:p>
+            <a:r>
+              <a:rPr lang="en-AU" dirty="0"/>
+              <a:t>This recommendation justifies further work on how the policies mechanically influence each other – but in this presentation we discuss the tension due to </a:t>
+            </a:r>
+            <a:r>
+              <a:rPr lang="en-AU" i="1" dirty="0"/>
+              <a:t>non-cooperative strategic motives</a:t>
+            </a:r>
+            <a:r>
+              <a:rPr lang="en-AU" dirty="0"/>
+              <a:t>.</a:t>
+            </a:r>
+            <a:br>
+              <a:rPr lang="en-AU" dirty="0"/>
+            </a:br>
+            <a:endParaRPr lang="en-AU" dirty="0"/>
+          </a:p>
+          <a:p>
+            <a:r>
+              <a:rPr lang="en-AU" dirty="0"/>
+              <a:t>Fiscal and monetary actions both post-GFC and post-COVID have involved what looks like “pre-commitment” actions by governments and central banks – costly Budget announcements, communication on interest rate paths, quantitative easing, debates about central bank independence.</a:t>
+            </a:r>
+          </a:p>
+          <a:p>
+            <a:endParaRPr lang="en-AU" dirty="0"/>
+          </a:p>
+          <a:p>
+            <a:r>
+              <a:rPr lang="en-AU" dirty="0"/>
+              <a:t>These motives imply that modelling strategic behaviour matters.</a:t>
+            </a:r>
+          </a:p>
+          <a:p>
+            <a:endParaRPr lang="en-AU" dirty="0"/>
+          </a:p>
+          <a:p>
+            <a:r>
+              <a:rPr lang="en-AU" dirty="0"/>
+              <a:t>Can game theory be used to understand and model this relationship?</a:t>
+            </a:r>
+          </a:p>
+        </p:txBody>
+      </p:sp>
+    </p:spTree>
+    <p:extLst>
+      <p:ext uri="{BB962C8B-B14F-4D97-AF65-F5344CB8AC3E}">
+        <p14:creationId xmlns:p14="http://schemas.microsoft.com/office/powerpoint/2010/main" val="3510103798"/>
+      </p:ext>
+    </p:extLst>
+  </p:cSld>
+  <p:clrMapOvr>
+    <a:masterClrMapping/>
+  </p:clrMapOvr>
+</p:sld>
+</file>
+
+<file path=ppt/slides/slide20.xml><?xml version="1.0" encoding="utf-8"?>
 <p:sld xmlns:a="http://schemas.openxmlformats.org/drawingml/2006/main" xmlns:r="http://schemas.openxmlformats.org/officeDocument/2006/relationships" xmlns:p="http://schemas.openxmlformats.org/presentationml/2006/main">
   <p:cSld>
     <p:spTree>
@@ -20165,167 +21303,7 @@
 </p:sld>
 </file>
 
-<file path=ppt/slides/slide2.xml><?xml version="1.0" encoding="utf-8"?>
-<p:sld xmlns:a="http://schemas.openxmlformats.org/drawingml/2006/main" xmlns:r="http://schemas.openxmlformats.org/officeDocument/2006/relationships" xmlns:p="http://schemas.openxmlformats.org/presentationml/2006/main">
-  <p:cSld>
-    <p:spTree>
-      <p:nvGrpSpPr>
-        <p:cNvPr id="1" name="">
-          <a:extLst>
-            <a:ext uri="{FF2B5EF4-FFF2-40B4-BE49-F238E27FC236}">
-              <a16:creationId xmlns:a16="http://schemas.microsoft.com/office/drawing/2014/main" id="{213BA21E-40E0-C83B-B5B2-392226084C71}"/>
-            </a:ext>
-          </a:extLst>
-        </p:cNvPr>
-        <p:cNvGrpSpPr/>
-        <p:nvPr/>
-      </p:nvGrpSpPr>
-      <p:grpSpPr>
-        <a:xfrm>
-          <a:off x="0" y="0"/>
-          <a:ext cx="0" cy="0"/>
-          <a:chOff x="0" y="0"/>
-          <a:chExt cx="0" cy="0"/>
-        </a:xfrm>
-      </p:grpSpPr>
-      <p:sp>
-        <p:nvSpPr>
-          <p:cNvPr id="2" name="Title 1">
-            <a:extLst>
-              <a:ext uri="{FF2B5EF4-FFF2-40B4-BE49-F238E27FC236}">
-                <a16:creationId xmlns:a16="http://schemas.microsoft.com/office/drawing/2014/main" id="{6CDDA86D-53AF-B2DB-C0A2-22180B9363A6}"/>
-              </a:ext>
-            </a:extLst>
-          </p:cNvPr>
-          <p:cNvSpPr>
-            <a:spLocks noGrp="1"/>
-          </p:cNvSpPr>
-          <p:nvPr>
-            <p:ph type="title"/>
-          </p:nvPr>
-        </p:nvSpPr>
-        <p:spPr/>
-        <p:txBody>
-          <a:bodyPr/>
-          <a:lstStyle/>
-          <a:p>
-            <a:r>
-              <a:rPr lang="en-AU" dirty="0"/>
-              <a:t>Motivation</a:t>
-            </a:r>
-          </a:p>
-        </p:txBody>
-      </p:sp>
-      <p:sp>
-        <p:nvSpPr>
-          <p:cNvPr id="3" name="Content Placeholder 2">
-            <a:extLst>
-              <a:ext uri="{FF2B5EF4-FFF2-40B4-BE49-F238E27FC236}">
-                <a16:creationId xmlns:a16="http://schemas.microsoft.com/office/drawing/2014/main" id="{A945028C-DE28-5D34-A8A5-078B5529683E}"/>
-              </a:ext>
-            </a:extLst>
-          </p:cNvPr>
-          <p:cNvSpPr>
-            <a:spLocks noGrp="1"/>
-          </p:cNvSpPr>
-          <p:nvPr>
-            <p:ph sz="half" idx="1"/>
-          </p:nvPr>
-        </p:nvSpPr>
-        <p:spPr>
-          <a:xfrm>
-            <a:off x="313184" y="820588"/>
-            <a:ext cx="8521254" cy="4127425"/>
-          </a:xfrm>
-        </p:spPr>
-        <p:txBody>
-          <a:bodyPr>
-            <a:normAutofit fontScale="92500" lnSpcReduction="20000"/>
-          </a:bodyPr>
-          <a:lstStyle/>
-          <a:p>
-            <a:r>
-              <a:rPr lang="en-AU" dirty="0"/>
-              <a:t>In </a:t>
-            </a:r>
-            <a:r>
-              <a:rPr lang="en-AU" b="1" dirty="0"/>
-              <a:t>Recommendation 3</a:t>
-            </a:r>
-            <a:r>
-              <a:rPr lang="en-AU" dirty="0"/>
-              <a:t> of the RBA review, the importance of </a:t>
-            </a:r>
-            <a:r>
-              <a:rPr lang="en-AU" i="1" dirty="0"/>
-              <a:t>fiscal-monetary coordination</a:t>
-            </a:r>
-            <a:r>
-              <a:rPr lang="en-AU" dirty="0"/>
-              <a:t> was highlighted.</a:t>
-            </a:r>
-          </a:p>
-          <a:p>
-            <a:endParaRPr lang="en-AU" dirty="0"/>
-          </a:p>
-          <a:p>
-            <a:r>
-              <a:rPr lang="en-AU" dirty="0"/>
-              <a:t>This recommendation justifies further work on how the policies mechanically influence each other – but in this presentation we discuss the tension due to </a:t>
-            </a:r>
-            <a:r>
-              <a:rPr lang="en-AU" i="1" dirty="0"/>
-              <a:t>non-cooperative strategic motives</a:t>
-            </a:r>
-            <a:r>
-              <a:rPr lang="en-AU" dirty="0"/>
-              <a:t>.</a:t>
-            </a:r>
-            <a:br>
-              <a:rPr lang="en-AU" dirty="0"/>
-            </a:br>
-            <a:endParaRPr lang="en-AU" dirty="0"/>
-          </a:p>
-          <a:p>
-            <a:r>
-              <a:rPr lang="en-AU" dirty="0"/>
-              <a:t>Fiscal and monetary actions both post-GFC and post-COVID have involved what looks like “pre-commitment” actions by governments and central banks – costly Budget announcements, communication on interest rate paths, quantitative easing, debates about central bank independence.</a:t>
-            </a:r>
-          </a:p>
-          <a:p>
-            <a:endParaRPr lang="en-AU" dirty="0"/>
-          </a:p>
-          <a:p>
-            <a:r>
-              <a:rPr lang="en-AU" dirty="0"/>
-              <a:t>These motives imply that modelling strategic behaviour matters.</a:t>
-            </a:r>
-          </a:p>
-          <a:p>
-            <a:endParaRPr lang="en-AU" dirty="0"/>
-          </a:p>
-          <a:p>
-            <a:r>
-              <a:rPr lang="en-AU" dirty="0"/>
-              <a:t>Can game theory be used to understand and model this relationship?</a:t>
-            </a:r>
-          </a:p>
-        </p:txBody>
-      </p:sp>
-    </p:spTree>
-    <p:extLst>
-      <p:ext uri="{BB962C8B-B14F-4D97-AF65-F5344CB8AC3E}">
-        <p14:creationId xmlns:p14="http://schemas.microsoft.com/office/powerpoint/2010/main" val="3510103798"/>
-      </p:ext>
-    </p:extLst>
-  </p:cSld>
-  <p:clrMapOvr>
-    <a:masterClrMapping/>
-  </p:clrMapOvr>
-</p:sld>
-</file>
-
-<file path=ppt/slides/slide20.xml><?xml version="1.0" encoding="utf-8"?>
+<file path=ppt/slides/slide21.xml><?xml version="1.0" encoding="utf-8"?>
 <p:sld xmlns:a="http://schemas.openxmlformats.org/drawingml/2006/main" xmlns:r="http://schemas.openxmlformats.org/officeDocument/2006/relationships" xmlns:p="http://schemas.openxmlformats.org/presentationml/2006/main" show="0">
   <p:cSld>
     <p:spTree>
@@ -20663,7 +21641,7 @@
 </p:sld>
 </file>
 
-<file path=ppt/slides/slide21.xml><?xml version="1.0" encoding="utf-8"?>
+<file path=ppt/slides/slide22.xml><?xml version="1.0" encoding="utf-8"?>
 <p:sld xmlns:a="http://schemas.openxmlformats.org/drawingml/2006/main" xmlns:r="http://schemas.openxmlformats.org/officeDocument/2006/relationships" xmlns:p="http://schemas.openxmlformats.org/presentationml/2006/main" show="0">
   <p:cSld>
     <p:spTree>
@@ -20779,7 +21757,7 @@
 </p:sld>
 </file>
 
-<file path=ppt/slides/slide22.xml><?xml version="1.0" encoding="utf-8"?>
+<file path=ppt/slides/slide23.xml><?xml version="1.0" encoding="utf-8"?>
 <p:sld xmlns:a="http://schemas.openxmlformats.org/drawingml/2006/main" xmlns:r="http://schemas.openxmlformats.org/officeDocument/2006/relationships" xmlns:p="http://schemas.openxmlformats.org/presentationml/2006/main" show="0">
   <p:cSld>
     <p:spTree>
@@ -20895,7 +21873,7 @@
 </p:sld>
 </file>
 
-<file path=ppt/slides/slide23.xml><?xml version="1.0" encoding="utf-8"?>
+<file path=ppt/slides/slide24.xml><?xml version="1.0" encoding="utf-8"?>
 <p:sld xmlns:a="http://schemas.openxmlformats.org/drawingml/2006/main" xmlns:r="http://schemas.openxmlformats.org/officeDocument/2006/relationships" xmlns:p="http://schemas.openxmlformats.org/presentationml/2006/main">
   <p:cSld>
     <p:spTree>
@@ -21093,8 +22071,8 @@
 </p:sld>
 </file>
 
-<file path=ppt/slides/slide24.xml><?xml version="1.0" encoding="utf-8"?>
-<p:sld xmlns:a="http://schemas.openxmlformats.org/drawingml/2006/main" xmlns:r="http://schemas.openxmlformats.org/officeDocument/2006/relationships" xmlns:p="http://schemas.openxmlformats.org/presentationml/2006/main">
+<file path=ppt/slides/slide25.xml><?xml version="1.0" encoding="utf-8"?>
+<p:sld xmlns:a="http://schemas.openxmlformats.org/drawingml/2006/main" xmlns:r="http://schemas.openxmlformats.org/officeDocument/2006/relationships" xmlns:p="http://schemas.openxmlformats.org/presentationml/2006/main" show="0">
   <p:cSld>
     <p:spTree>
       <p:nvGrpSpPr>
@@ -22463,8 +23441,8 @@
 </p:sld>
 </file>
 
-<file path=ppt/slides/slide25.xml><?xml version="1.0" encoding="utf-8"?>
-<p:sld xmlns:a="http://schemas.openxmlformats.org/drawingml/2006/main" xmlns:r="http://schemas.openxmlformats.org/officeDocument/2006/relationships" xmlns:p="http://schemas.openxmlformats.org/presentationml/2006/main">
+<file path=ppt/slides/slide26.xml><?xml version="1.0" encoding="utf-8"?>
+<p:sld xmlns:a="http://schemas.openxmlformats.org/drawingml/2006/main" xmlns:r="http://schemas.openxmlformats.org/officeDocument/2006/relationships" xmlns:p="http://schemas.openxmlformats.org/presentationml/2006/main" show="0">
   <p:cSld>
     <p:spTree>
       <p:nvGrpSpPr>
@@ -22651,8 +23629,8 @@
 </p:sld>
 </file>
 
-<file path=ppt/slides/slide26.xml><?xml version="1.0" encoding="utf-8"?>
-<p:sld xmlns:a="http://schemas.openxmlformats.org/drawingml/2006/main" xmlns:r="http://schemas.openxmlformats.org/officeDocument/2006/relationships" xmlns:p="http://schemas.openxmlformats.org/presentationml/2006/main">
+<file path=ppt/slides/slide27.xml><?xml version="1.0" encoding="utf-8"?>
+<p:sld xmlns:a="http://schemas.openxmlformats.org/drawingml/2006/main" xmlns:r="http://schemas.openxmlformats.org/officeDocument/2006/relationships" xmlns:p="http://schemas.openxmlformats.org/presentationml/2006/main" show="0">
   <p:cSld>
     <p:spTree>
       <p:nvGrpSpPr>
@@ -22814,7 +23792,7 @@
 </p:sld>
 </file>
 
-<file path=ppt/slides/slide27.xml><?xml version="1.0" encoding="utf-8"?>
+<file path=ppt/slides/slide28.xml><?xml version="1.0" encoding="utf-8"?>
 <p:sld xmlns:a="http://schemas.openxmlformats.org/drawingml/2006/main" xmlns:r="http://schemas.openxmlformats.org/officeDocument/2006/relationships" xmlns:p="http://schemas.openxmlformats.org/presentationml/2006/main" show="0">
   <p:cSld>
     <p:spTree>
@@ -22936,7 +23914,7 @@
 </p:sld>
 </file>
 
-<file path=ppt/slides/slide28.xml><?xml version="1.0" encoding="utf-8"?>
+<file path=ppt/slides/slide29.xml><?xml version="1.0" encoding="utf-8"?>
 <p:sld xmlns:a="http://schemas.openxmlformats.org/drawingml/2006/main" xmlns:r="http://schemas.openxmlformats.org/officeDocument/2006/relationships" xmlns:p="http://schemas.openxmlformats.org/presentationml/2006/main">
   <p:cSld>
     <p:spTree>
@@ -24257,7 +25235,139 @@
 </p:sld>
 </file>
 
-<file path=ppt/slides/slide29.xml><?xml version="1.0" encoding="utf-8"?>
+<file path=ppt/slides/slide3.xml><?xml version="1.0" encoding="utf-8"?>
+<p:sld xmlns:a="http://schemas.openxmlformats.org/drawingml/2006/main" xmlns:r="http://schemas.openxmlformats.org/officeDocument/2006/relationships" xmlns:p="http://schemas.openxmlformats.org/presentationml/2006/main">
+  <p:cSld>
+    <p:spTree>
+      <p:nvGrpSpPr>
+        <p:cNvPr id="1" name=""/>
+        <p:cNvGrpSpPr/>
+        <p:nvPr/>
+      </p:nvGrpSpPr>
+      <p:grpSpPr>
+        <a:xfrm>
+          <a:off x="0" y="0"/>
+          <a:ext cx="0" cy="0"/>
+          <a:chOff x="0" y="0"/>
+          <a:chExt cx="0" cy="0"/>
+        </a:xfrm>
+      </p:grpSpPr>
+      <p:sp>
+        <p:nvSpPr>
+          <p:cNvPr id="2" name="Title 1">
+            <a:extLst>
+              <a:ext uri="{FF2B5EF4-FFF2-40B4-BE49-F238E27FC236}">
+                <a16:creationId xmlns:a16="http://schemas.microsoft.com/office/drawing/2014/main" id="{D71FCB0A-0301-7B7A-68D5-BDB843D036B4}"/>
+              </a:ext>
+            </a:extLst>
+          </p:cNvPr>
+          <p:cNvSpPr>
+            <a:spLocks noGrp="1"/>
+          </p:cNvSpPr>
+          <p:nvPr>
+            <p:ph type="title"/>
+          </p:nvPr>
+        </p:nvSpPr>
+        <p:spPr/>
+        <p:txBody>
+          <a:bodyPr/>
+          <a:lstStyle/>
+          <a:p>
+            <a:r>
+              <a:rPr lang="en-AU" dirty="0"/>
+              <a:t>Motivation</a:t>
+            </a:r>
+          </a:p>
+        </p:txBody>
+      </p:sp>
+      <p:sp>
+        <p:nvSpPr>
+          <p:cNvPr id="3" name="Content Placeholder 2">
+            <a:extLst>
+              <a:ext uri="{FF2B5EF4-FFF2-40B4-BE49-F238E27FC236}">
+                <a16:creationId xmlns:a16="http://schemas.microsoft.com/office/drawing/2014/main" id="{0D706D99-1B55-678B-2650-4DD501BD2EE1}"/>
+              </a:ext>
+            </a:extLst>
+          </p:cNvPr>
+          <p:cNvSpPr>
+            <a:spLocks noGrp="1"/>
+          </p:cNvSpPr>
+          <p:nvPr>
+            <p:ph sz="half" idx="1"/>
+          </p:nvPr>
+        </p:nvSpPr>
+        <p:spPr>
+          <a:xfrm>
+            <a:off x="313184" y="820588"/>
+            <a:ext cx="8521254" cy="4127425"/>
+          </a:xfrm>
+        </p:spPr>
+        <p:txBody>
+          <a:bodyPr>
+            <a:normAutofit/>
+          </a:bodyPr>
+          <a:lstStyle/>
+          <a:p>
+            <a:r>
+              <a:rPr lang="en-AU" dirty="0"/>
+              <a:t>Why does this matter?</a:t>
+            </a:r>
+          </a:p>
+          <a:p>
+            <a:endParaRPr lang="en-AU" dirty="0"/>
+          </a:p>
+          <a:p>
+            <a:r>
+              <a:rPr lang="en-AU" dirty="0"/>
+              <a:t>Insufficient stimulus post-GFC.</a:t>
+            </a:r>
+          </a:p>
+          <a:p>
+            <a:endParaRPr lang="en-AU" dirty="0"/>
+          </a:p>
+          <a:p>
+            <a:r>
+              <a:rPr lang="en-AU" dirty="0"/>
+              <a:t>Excessive stimulus post-COVID.</a:t>
+            </a:r>
+          </a:p>
+          <a:p>
+            <a:endParaRPr lang="en-AU" dirty="0"/>
+          </a:p>
+          <a:p>
+            <a:r>
+              <a:rPr lang="en-AU" dirty="0"/>
+              <a:t>Both scenarios suggest that fiscal and monetary authorities may have been engaged in a non-cooperative game.</a:t>
+            </a:r>
+          </a:p>
+          <a:p>
+            <a:endParaRPr lang="en-AU" dirty="0"/>
+          </a:p>
+          <a:p>
+            <a:r>
+              <a:rPr lang="en-AU" dirty="0"/>
+              <a:t>Has growing policy stickiness (pre-commitment) exacerbated this game? Does the type of shock matter?</a:t>
+            </a:r>
+          </a:p>
+          <a:p>
+            <a:endParaRPr lang="en-AU" dirty="0"/>
+          </a:p>
+        </p:txBody>
+      </p:sp>
+    </p:spTree>
+    <p:extLst>
+      <p:ext uri="{BB962C8B-B14F-4D97-AF65-F5344CB8AC3E}">
+        <p14:creationId xmlns:p14="http://schemas.microsoft.com/office/powerpoint/2010/main" val="517354520"/>
+      </p:ext>
+    </p:extLst>
+  </p:cSld>
+  <p:clrMapOvr>
+    <a:masterClrMapping/>
+  </p:clrMapOvr>
+</p:sld>
+</file>
+
+<file path=ppt/slides/slide30.xml><?xml version="1.0" encoding="utf-8"?>
 <p:sld xmlns:a="http://schemas.openxmlformats.org/drawingml/2006/main" xmlns:r="http://schemas.openxmlformats.org/officeDocument/2006/relationships" xmlns:p="http://schemas.openxmlformats.org/presentationml/2006/main">
   <p:cSld>
     <p:spTree>
@@ -25209,139 +26319,7 @@
 </p:sld>
 </file>
 
-<file path=ppt/slides/slide3.xml><?xml version="1.0" encoding="utf-8"?>
-<p:sld xmlns:a="http://schemas.openxmlformats.org/drawingml/2006/main" xmlns:r="http://schemas.openxmlformats.org/officeDocument/2006/relationships" xmlns:p="http://schemas.openxmlformats.org/presentationml/2006/main">
-  <p:cSld>
-    <p:spTree>
-      <p:nvGrpSpPr>
-        <p:cNvPr id="1" name=""/>
-        <p:cNvGrpSpPr/>
-        <p:nvPr/>
-      </p:nvGrpSpPr>
-      <p:grpSpPr>
-        <a:xfrm>
-          <a:off x="0" y="0"/>
-          <a:ext cx="0" cy="0"/>
-          <a:chOff x="0" y="0"/>
-          <a:chExt cx="0" cy="0"/>
-        </a:xfrm>
-      </p:grpSpPr>
-      <p:sp>
-        <p:nvSpPr>
-          <p:cNvPr id="2" name="Title 1">
-            <a:extLst>
-              <a:ext uri="{FF2B5EF4-FFF2-40B4-BE49-F238E27FC236}">
-                <a16:creationId xmlns:a16="http://schemas.microsoft.com/office/drawing/2014/main" id="{D71FCB0A-0301-7B7A-68D5-BDB843D036B4}"/>
-              </a:ext>
-            </a:extLst>
-          </p:cNvPr>
-          <p:cNvSpPr>
-            <a:spLocks noGrp="1"/>
-          </p:cNvSpPr>
-          <p:nvPr>
-            <p:ph type="title"/>
-          </p:nvPr>
-        </p:nvSpPr>
-        <p:spPr/>
-        <p:txBody>
-          <a:bodyPr/>
-          <a:lstStyle/>
-          <a:p>
-            <a:r>
-              <a:rPr lang="en-AU" dirty="0"/>
-              <a:t>Motivation</a:t>
-            </a:r>
-          </a:p>
-        </p:txBody>
-      </p:sp>
-      <p:sp>
-        <p:nvSpPr>
-          <p:cNvPr id="3" name="Content Placeholder 2">
-            <a:extLst>
-              <a:ext uri="{FF2B5EF4-FFF2-40B4-BE49-F238E27FC236}">
-                <a16:creationId xmlns:a16="http://schemas.microsoft.com/office/drawing/2014/main" id="{0D706D99-1B55-678B-2650-4DD501BD2EE1}"/>
-              </a:ext>
-            </a:extLst>
-          </p:cNvPr>
-          <p:cNvSpPr>
-            <a:spLocks noGrp="1"/>
-          </p:cNvSpPr>
-          <p:nvPr>
-            <p:ph sz="half" idx="1"/>
-          </p:nvPr>
-        </p:nvSpPr>
-        <p:spPr>
-          <a:xfrm>
-            <a:off x="313184" y="820588"/>
-            <a:ext cx="8521254" cy="4127425"/>
-          </a:xfrm>
-        </p:spPr>
-        <p:txBody>
-          <a:bodyPr>
-            <a:normAutofit/>
-          </a:bodyPr>
-          <a:lstStyle/>
-          <a:p>
-            <a:r>
-              <a:rPr lang="en-AU" dirty="0"/>
-              <a:t>Why does this matter?</a:t>
-            </a:r>
-          </a:p>
-          <a:p>
-            <a:endParaRPr lang="en-AU" dirty="0"/>
-          </a:p>
-          <a:p>
-            <a:r>
-              <a:rPr lang="en-AU" dirty="0"/>
-              <a:t>Insufficient stimulus post-GFC.</a:t>
-            </a:r>
-          </a:p>
-          <a:p>
-            <a:endParaRPr lang="en-AU" dirty="0"/>
-          </a:p>
-          <a:p>
-            <a:r>
-              <a:rPr lang="en-AU" dirty="0"/>
-              <a:t>Excessive stimulus post-COVID.</a:t>
-            </a:r>
-          </a:p>
-          <a:p>
-            <a:endParaRPr lang="en-AU" dirty="0"/>
-          </a:p>
-          <a:p>
-            <a:r>
-              <a:rPr lang="en-AU" dirty="0"/>
-              <a:t>Both scenarios suggest that fiscal and monetary authorities may have been engaged in a non-cooperative game.</a:t>
-            </a:r>
-          </a:p>
-          <a:p>
-            <a:endParaRPr lang="en-AU" dirty="0"/>
-          </a:p>
-          <a:p>
-            <a:r>
-              <a:rPr lang="en-AU" dirty="0"/>
-              <a:t>Has growing policy stickiness (pre-commitment) exacerbated this game? Does the type of shock matter?</a:t>
-            </a:r>
-          </a:p>
-          <a:p>
-            <a:endParaRPr lang="en-AU" dirty="0"/>
-          </a:p>
-        </p:txBody>
-      </p:sp>
-    </p:spTree>
-    <p:extLst>
-      <p:ext uri="{BB962C8B-B14F-4D97-AF65-F5344CB8AC3E}">
-        <p14:creationId xmlns:p14="http://schemas.microsoft.com/office/powerpoint/2010/main" val="517354520"/>
-      </p:ext>
-    </p:extLst>
-  </p:cSld>
-  <p:clrMapOvr>
-    <a:masterClrMapping/>
-  </p:clrMapOvr>
-</p:sld>
-</file>
-
-<file path=ppt/slides/slide30.xml><?xml version="1.0" encoding="utf-8"?>
+<file path=ppt/slides/slide31.xml><?xml version="1.0" encoding="utf-8"?>
 <p:sld xmlns:a="http://schemas.openxmlformats.org/drawingml/2006/main" xmlns:r="http://schemas.openxmlformats.org/officeDocument/2006/relationships" xmlns:p="http://schemas.openxmlformats.org/presentationml/2006/main">
   <p:cSld>
     <p:spTree>
@@ -25405,7 +26383,181 @@
 </p:sld>
 </file>
 
-<file path=ppt/slides/slide31.xml><?xml version="1.0" encoding="utf-8"?>
+<file path=ppt/slides/slide32.xml><?xml version="1.0" encoding="utf-8"?>
+<p:sld xmlns:a="http://schemas.openxmlformats.org/drawingml/2006/main" xmlns:r="http://schemas.openxmlformats.org/officeDocument/2006/relationships" xmlns:p="http://schemas.openxmlformats.org/presentationml/2006/main">
+  <p:cSld>
+    <p:spTree>
+      <p:nvGrpSpPr>
+        <p:cNvPr id="1" name="">
+          <a:extLst>
+            <a:ext uri="{FF2B5EF4-FFF2-40B4-BE49-F238E27FC236}">
+              <a16:creationId xmlns:a16="http://schemas.microsoft.com/office/drawing/2014/main" id="{B286DE15-18B2-771F-78AF-3CBE13A026F4}"/>
+            </a:ext>
+          </a:extLst>
+        </p:cNvPr>
+        <p:cNvGrpSpPr/>
+        <p:nvPr/>
+      </p:nvGrpSpPr>
+      <p:grpSpPr>
+        <a:xfrm>
+          <a:off x="0" y="0"/>
+          <a:ext cx="0" cy="0"/>
+          <a:chOff x="0" y="0"/>
+          <a:chExt cx="0" cy="0"/>
+        </a:xfrm>
+      </p:grpSpPr>
+      <p:sp>
+        <p:nvSpPr>
+          <p:cNvPr id="2" name="Title 1">
+            <a:extLst>
+              <a:ext uri="{FF2B5EF4-FFF2-40B4-BE49-F238E27FC236}">
+                <a16:creationId xmlns:a16="http://schemas.microsoft.com/office/drawing/2014/main" id="{83CA7DEA-E3FB-839B-A2A1-7A77DA25171F}"/>
+              </a:ext>
+            </a:extLst>
+          </p:cNvPr>
+          <p:cNvSpPr>
+            <a:spLocks noGrp="1"/>
+          </p:cNvSpPr>
+          <p:nvPr>
+            <p:ph type="title"/>
+          </p:nvPr>
+        </p:nvSpPr>
+        <p:spPr>
+          <a:xfrm>
+            <a:off x="107504" y="123478"/>
+            <a:ext cx="8784654" cy="540543"/>
+          </a:xfrm>
+        </p:spPr>
+        <p:txBody>
+          <a:bodyPr/>
+          <a:lstStyle/>
+          <a:p>
+            <a:r>
+              <a:rPr lang="en-AU" dirty="0"/>
+              <a:t>Dynamic equilibrium with varying adjustment costs</a:t>
+            </a:r>
+          </a:p>
+        </p:txBody>
+      </p:sp>
+    </p:spTree>
+    <p:extLst>
+      <p:ext uri="{BB962C8B-B14F-4D97-AF65-F5344CB8AC3E}">
+        <p14:creationId xmlns:p14="http://schemas.microsoft.com/office/powerpoint/2010/main" val="3260504445"/>
+      </p:ext>
+    </p:extLst>
+  </p:cSld>
+  <p:clrMapOvr>
+    <a:masterClrMapping/>
+  </p:clrMapOvr>
+</p:sld>
+</file>
+
+<file path=ppt/slides/slide33.xml><?xml version="1.0" encoding="utf-8"?>
+<p:sld xmlns:a="http://schemas.openxmlformats.org/drawingml/2006/main" xmlns:r="http://schemas.openxmlformats.org/officeDocument/2006/relationships" xmlns:p="http://schemas.openxmlformats.org/presentationml/2006/main">
+  <p:cSld>
+    <p:spTree>
+      <p:nvGrpSpPr>
+        <p:cNvPr id="1" name="">
+          <a:extLst>
+            <a:ext uri="{FF2B5EF4-FFF2-40B4-BE49-F238E27FC236}">
+              <a16:creationId xmlns:a16="http://schemas.microsoft.com/office/drawing/2014/main" id="{E5F22D82-63A5-7BCB-1BC6-BC540EA6E044}"/>
+            </a:ext>
+          </a:extLst>
+        </p:cNvPr>
+        <p:cNvGrpSpPr/>
+        <p:nvPr/>
+      </p:nvGrpSpPr>
+      <p:grpSpPr>
+        <a:xfrm>
+          <a:off x="0" y="0"/>
+          <a:ext cx="0" cy="0"/>
+          <a:chOff x="0" y="0"/>
+          <a:chExt cx="0" cy="0"/>
+        </a:xfrm>
+      </p:grpSpPr>
+      <p:sp>
+        <p:nvSpPr>
+          <p:cNvPr id="2" name="Title 1">
+            <a:extLst>
+              <a:ext uri="{FF2B5EF4-FFF2-40B4-BE49-F238E27FC236}">
+                <a16:creationId xmlns:a16="http://schemas.microsoft.com/office/drawing/2014/main" id="{C0EFD4A6-EDA0-AF3B-F422-6968FFE9D702}"/>
+              </a:ext>
+            </a:extLst>
+          </p:cNvPr>
+          <p:cNvSpPr>
+            <a:spLocks noGrp="1"/>
+          </p:cNvSpPr>
+          <p:nvPr>
+            <p:ph type="title"/>
+          </p:nvPr>
+        </p:nvSpPr>
+        <p:spPr>
+          <a:xfrm>
+            <a:off x="107504" y="123478"/>
+            <a:ext cx="8784654" cy="540543"/>
+          </a:xfrm>
+        </p:spPr>
+        <p:txBody>
+          <a:bodyPr/>
+          <a:lstStyle/>
+          <a:p>
+            <a:r>
+              <a:rPr lang="en-AU" dirty="0"/>
+              <a:t>Incentive for leadership</a:t>
+            </a:r>
+          </a:p>
+        </p:txBody>
+      </p:sp>
+      <p:sp>
+        <p:nvSpPr>
+          <p:cNvPr id="3" name="TextBox 2">
+            <a:extLst>
+              <a:ext uri="{FF2B5EF4-FFF2-40B4-BE49-F238E27FC236}">
+                <a16:creationId xmlns:a16="http://schemas.microsoft.com/office/drawing/2014/main" id="{B6C36512-F527-998F-353F-BA143DCEB4D8}"/>
+              </a:ext>
+            </a:extLst>
+          </p:cNvPr>
+          <p:cNvSpPr txBox="1"/>
+          <p:nvPr/>
+        </p:nvSpPr>
+        <p:spPr>
+          <a:xfrm>
+            <a:off x="251520" y="1275606"/>
+            <a:ext cx="8289449" cy="369332"/>
+          </a:xfrm>
+          <a:prstGeom prst="rect">
+            <a:avLst/>
+          </a:prstGeom>
+          <a:noFill/>
+        </p:spPr>
+        <p:txBody>
+          <a:bodyPr wrap="none" rtlCol="0">
+            <a:spAutoFit/>
+          </a:bodyPr>
+          <a:lstStyle/>
+          <a:p>
+            <a:r>
+              <a:rPr lang="en-US" dirty="0"/>
+              <a:t>Put in plots from game where fiscal adjustment cost is zero, and monetary rises</a:t>
+            </a:r>
+            <a:endParaRPr lang="en-NZ" dirty="0"/>
+          </a:p>
+        </p:txBody>
+      </p:sp>
+    </p:spTree>
+    <p:extLst>
+      <p:ext uri="{BB962C8B-B14F-4D97-AF65-F5344CB8AC3E}">
+        <p14:creationId xmlns:p14="http://schemas.microsoft.com/office/powerpoint/2010/main" val="2192702380"/>
+      </p:ext>
+    </p:extLst>
+  </p:cSld>
+  <p:clrMapOvr>
+    <a:masterClrMapping/>
+  </p:clrMapOvr>
+</p:sld>
+</file>
+
+<file path=ppt/slides/slide34.xml><?xml version="1.0" encoding="utf-8"?>
 <p:sld xmlns:a="http://schemas.openxmlformats.org/drawingml/2006/main" xmlns:r="http://schemas.openxmlformats.org/officeDocument/2006/relationships" xmlns:p="http://schemas.openxmlformats.org/presentationml/2006/main" show="0">
   <p:cSld>
     <p:spTree>
@@ -25523,7 +26675,7 @@
 </p:sld>
 </file>
 
-<file path=ppt/slides/slide32.xml><?xml version="1.0" encoding="utf-8"?>
+<file path=ppt/slides/slide35.xml><?xml version="1.0" encoding="utf-8"?>
 <p:sld xmlns:a="http://schemas.openxmlformats.org/drawingml/2006/main" xmlns:r="http://schemas.openxmlformats.org/officeDocument/2006/relationships" xmlns:p="http://schemas.openxmlformats.org/presentationml/2006/main">
   <p:cSld>
     <p:spTree>

</xml_diff>